<commit_message>
Adding diagram and additional edits
</commit_message>
<xml_diff>
--- a/docs/deployment_guide/images/f5-big-ip-virtual-edition-architecture-diagram.pptx
+++ b/docs/deployment_guide/images/f5-big-ip-virtual-edition-architecture-diagram.pptx
@@ -224,7 +224,7 @@
           <a:p>
             <a:fld id="{49A7721D-1176-A640-AC48-B82F78C92D56}" type="datetimeFigureOut">
               <a:rPr lang="en-US" smtClean="0"/>
-              <a:t>5/25/2022</a:t>
+              <a:t>5/26/2022</a:t>
             </a:fld>
             <a:endParaRPr lang="en-US" dirty="0"/>
           </a:p>
@@ -401,7 +401,7 @@
           <a:p>
             <a:fld id="{C884A089-FB25-6D46-9D21-F0F04A18BCA8}" type="datetimeFigureOut">
               <a:rPr lang="en-US" smtClean="0"/>
-              <a:t>5/25/2022</a:t>
+              <a:t>5/26/2022</a:t>
             </a:fld>
             <a:endParaRPr lang="en-US" dirty="0"/>
           </a:p>
@@ -1033,7 +1033,7 @@
           <a:p>
             <a:fld id="{C764DE79-268F-4C1A-8933-263129D2AF90}" type="datetimeFigureOut">
               <a:rPr lang="en-US" dirty="0"/>
-              <a:t>5/25/2022</a:t>
+              <a:t>5/26/2022</a:t>
             </a:fld>
             <a:endParaRPr lang="en-US" dirty="0"/>
           </a:p>
@@ -1204,7 +1204,7 @@
           <a:p>
             <a:fld id="{C764DE79-268F-4C1A-8933-263129D2AF90}" type="datetimeFigureOut">
               <a:rPr lang="en-US" dirty="0"/>
-              <a:t>5/25/2022</a:t>
+              <a:t>5/26/2022</a:t>
             </a:fld>
             <a:endParaRPr lang="en-US" dirty="0"/>
           </a:p>
@@ -1385,7 +1385,7 @@
           <a:p>
             <a:fld id="{C764DE79-268F-4C1A-8933-263129D2AF90}" type="datetimeFigureOut">
               <a:rPr lang="en-US" dirty="0"/>
-              <a:t>5/25/2022</a:t>
+              <a:t>5/26/2022</a:t>
             </a:fld>
             <a:endParaRPr lang="en-US" dirty="0"/>
           </a:p>
@@ -1578,7 +1578,7 @@
           <a:p>
             <a:fld id="{C764DE79-268F-4C1A-8933-263129D2AF90}" type="datetimeFigureOut">
               <a:rPr lang="en-US" dirty="0"/>
-              <a:t>5/25/2022</a:t>
+              <a:t>5/26/2022</a:t>
             </a:fld>
             <a:endParaRPr lang="en-US" dirty="0"/>
           </a:p>
@@ -1749,7 +1749,7 @@
           <a:p>
             <a:fld id="{C764DE79-268F-4C1A-8933-263129D2AF90}" type="datetimeFigureOut">
               <a:rPr lang="en-US" dirty="0"/>
-              <a:t>5/25/2022</a:t>
+              <a:t>5/26/2022</a:t>
             </a:fld>
             <a:endParaRPr lang="en-US" dirty="0"/>
           </a:p>
@@ -1994,7 +1994,7 @@
           <a:p>
             <a:fld id="{C764DE79-268F-4C1A-8933-263129D2AF90}" type="datetimeFigureOut">
               <a:rPr lang="en-US" dirty="0"/>
-              <a:t>5/25/2022</a:t>
+              <a:t>5/26/2022</a:t>
             </a:fld>
             <a:endParaRPr lang="en-US" dirty="0"/>
           </a:p>
@@ -2227,7 +2227,7 @@
           <a:p>
             <a:fld id="{C764DE79-268F-4C1A-8933-263129D2AF90}" type="datetimeFigureOut">
               <a:rPr lang="en-US" dirty="0"/>
-              <a:t>5/25/2022</a:t>
+              <a:t>5/26/2022</a:t>
             </a:fld>
             <a:endParaRPr lang="en-US" dirty="0"/>
           </a:p>
@@ -2595,7 +2595,7 @@
           <a:p>
             <a:fld id="{C764DE79-268F-4C1A-8933-263129D2AF90}" type="datetimeFigureOut">
               <a:rPr lang="en-US" dirty="0"/>
-              <a:t>5/25/2022</a:t>
+              <a:t>5/26/2022</a:t>
             </a:fld>
             <a:endParaRPr lang="en-US" dirty="0"/>
           </a:p>
@@ -2714,7 +2714,7 @@
           <a:p>
             <a:fld id="{C764DE79-268F-4C1A-8933-263129D2AF90}" type="datetimeFigureOut">
               <a:rPr lang="en-US" dirty="0"/>
-              <a:t>5/25/2022</a:t>
+              <a:t>5/26/2022</a:t>
             </a:fld>
             <a:endParaRPr lang="en-US" dirty="0"/>
           </a:p>
@@ -3083,7 +3083,7 @@
           <a:p>
             <a:fld id="{C764DE79-268F-4C1A-8933-263129D2AF90}" type="datetimeFigureOut">
               <a:rPr lang="en-US" dirty="0"/>
-              <a:t>5/25/2022</a:t>
+              <a:t>5/26/2022</a:t>
             </a:fld>
             <a:endParaRPr lang="en-US" dirty="0"/>
           </a:p>
@@ -3617,7 +3617,7 @@
           <a:p>
             <a:fld id="{C764DE79-268F-4C1A-8933-263129D2AF90}" type="datetimeFigureOut">
               <a:rPr lang="en-US" dirty="0"/>
-              <a:t>5/25/2022</a:t>
+              <a:t>5/26/2022</a:t>
             </a:fld>
             <a:endParaRPr lang="en-US" dirty="0"/>
           </a:p>
@@ -4243,7 +4243,7 @@
         <p:spPr>
           <a:xfrm>
             <a:off x="3749040" y="2286000"/>
-            <a:ext cx="2194560" cy="1828800"/>
+            <a:ext cx="2194560" cy="1938872"/>
           </a:xfrm>
           <a:prstGeom prst="rect">
             <a:avLst/>
@@ -4310,7 +4310,7 @@
         </p:nvSpPr>
         <p:spPr bwMode="auto">
           <a:xfrm>
-            <a:off x="3726066" y="3476640"/>
+            <a:off x="3726066" y="3267090"/>
             <a:ext cx="1234766" cy="261610"/>
           </a:xfrm>
           <a:prstGeom prst="rect">
@@ -4484,7 +4484,7 @@
         </p:blipFill>
         <p:spPr bwMode="auto">
           <a:xfrm>
-            <a:off x="4114800" y="3017520"/>
+            <a:off x="4114800" y="2807970"/>
             <a:ext cx="457200" cy="457200"/>
           </a:xfrm>
           <a:prstGeom prst="rect">
@@ -4919,7 +4919,7 @@
         </p:blipFill>
         <p:spPr bwMode="auto">
           <a:xfrm>
-            <a:off x="5208604" y="3017520"/>
+            <a:off x="5208604" y="2807970"/>
             <a:ext cx="457200" cy="457200"/>
           </a:xfrm>
           <a:prstGeom prst="rect">
@@ -4966,7 +4966,7 @@
         </p:nvSpPr>
         <p:spPr bwMode="auto">
           <a:xfrm>
-            <a:off x="4941993" y="3476264"/>
+            <a:off x="4941993" y="3266714"/>
             <a:ext cx="992293" cy="261610"/>
           </a:xfrm>
           <a:prstGeom prst="rect">
@@ -5197,7 +5197,7 @@
         <p:spPr>
           <a:xfrm>
             <a:off x="7955280" y="2286000"/>
-            <a:ext cx="2194560" cy="1828800"/>
+            <a:ext cx="2194560" cy="1920240"/>
           </a:xfrm>
           <a:prstGeom prst="rect">
             <a:avLst/>
@@ -5264,7 +5264,7 @@
         </p:nvSpPr>
         <p:spPr bwMode="auto">
           <a:xfrm>
-            <a:off x="9094470" y="3478530"/>
+            <a:off x="9094470" y="3268980"/>
             <a:ext cx="1107610" cy="261610"/>
           </a:xfrm>
           <a:prstGeom prst="rect">
@@ -5438,7 +5438,7 @@
         </p:blipFill>
         <p:spPr bwMode="auto">
           <a:xfrm>
-            <a:off x="9418320" y="3017520"/>
+            <a:off x="9418320" y="2807970"/>
             <a:ext cx="457200" cy="457200"/>
           </a:xfrm>
           <a:prstGeom prst="rect">
@@ -5656,7 +5656,7 @@
         </p:blipFill>
         <p:spPr bwMode="auto">
           <a:xfrm>
-            <a:off x="8229600" y="3017520"/>
+            <a:off x="8229600" y="2807970"/>
             <a:ext cx="457200" cy="457200"/>
           </a:xfrm>
           <a:prstGeom prst="rect">
@@ -5703,7 +5703,7 @@
         </p:nvSpPr>
         <p:spPr bwMode="auto">
           <a:xfrm>
-            <a:off x="8051123" y="3480074"/>
+            <a:off x="8051123" y="3270524"/>
             <a:ext cx="818726" cy="261610"/>
           </a:xfrm>
           <a:prstGeom prst="rect">
@@ -5867,7 +5867,7 @@
         </p:nvSpPr>
         <p:spPr>
           <a:xfrm>
-            <a:off x="4937760" y="2834640"/>
+            <a:off x="4937760" y="2625090"/>
             <a:ext cx="4114800" cy="1005840"/>
           </a:xfrm>
           <a:prstGeom prst="rect">
@@ -5987,7 +5987,7 @@
         </p:blipFill>
         <p:spPr>
           <a:xfrm>
-            <a:off x="6806198" y="2830830"/>
+            <a:off x="6806198" y="2621280"/>
             <a:ext cx="381000" cy="381000"/>
           </a:xfrm>
           <a:prstGeom prst="rect">
@@ -6206,18 +6206,13 @@
           <a:p>
             <a:pPr algn="ctr" eaLnBrk="1" hangingPunct="1"/>
             <a:r>
-              <a:rPr lang="en-US" altLang="en-US" sz="1100">
+              <a:rPr lang="en-US" altLang="en-US" sz="1100" dirty="0">
                 <a:latin typeface="Arial" panose="020B0604020202020204" pitchFamily="34" charset="0"/>
                 <a:ea typeface="Amazon Ember" panose="020B0603020204020204" pitchFamily="34" charset="0"/>
                 <a:cs typeface="Arial" panose="020B0604020202020204" pitchFamily="34" charset="0"/>
               </a:rPr>
               <a:t>F5 BIG-IP instance</a:t>
             </a:r>
-            <a:endParaRPr lang="en-US" altLang="en-US" sz="1100" dirty="0">
-              <a:latin typeface="Arial" panose="020B0604020202020204" pitchFamily="34" charset="0"/>
-              <a:ea typeface="Amazon Ember" panose="020B0603020204020204" pitchFamily="34" charset="0"/>
-              <a:cs typeface="Arial" panose="020B0604020202020204" pitchFamily="34" charset="0"/>
-            </a:endParaRPr>
           </a:p>
         </p:txBody>
       </p:sp>
@@ -6368,7 +6363,7 @@
         </p:nvSpPr>
         <p:spPr bwMode="auto">
           <a:xfrm>
-            <a:off x="8549852" y="5436870"/>
+            <a:off x="8549852" y="5479755"/>
             <a:ext cx="1115568" cy="430887"/>
           </a:xfrm>
           <a:prstGeom prst="rect">
@@ -6503,18 +6498,429 @@
           <a:p>
             <a:pPr algn="ctr" eaLnBrk="1" hangingPunct="1"/>
             <a:r>
-              <a:rPr lang="en-US" altLang="en-US" sz="1100">
+              <a:rPr lang="en-US" altLang="en-US" sz="1100" dirty="0">
                 <a:latin typeface="Arial" panose="020B0604020202020204" pitchFamily="34" charset="0"/>
                 <a:ea typeface="Amazon Ember" panose="020B0603020204020204" pitchFamily="34" charset="0"/>
                 <a:cs typeface="Arial" panose="020B0604020202020204" pitchFamily="34" charset="0"/>
               </a:rPr>
               <a:t>F5 BIG-IP instance</a:t>
             </a:r>
-            <a:endParaRPr lang="en-US" altLang="en-US" sz="1100" dirty="0">
-              <a:latin typeface="Arial" panose="020B0604020202020204" pitchFamily="34" charset="0"/>
-              <a:ea typeface="Amazon Ember" panose="020B0603020204020204" pitchFamily="34" charset="0"/>
-              <a:cs typeface="Arial" panose="020B0604020202020204" pitchFamily="34" charset="0"/>
-            </a:endParaRPr>
+          </a:p>
+        </p:txBody>
+      </p:sp>
+      <p:pic>
+        <p:nvPicPr>
+          <p:cNvPr id="1026" name="Picture 2" descr="C:\Users\annaone\AppData\Local\Temp\SNAGHTML2f497b0d.PNG">
+            <a:extLst>
+              <a:ext uri="{FF2B5EF4-FFF2-40B4-BE49-F238E27FC236}">
+                <a16:creationId xmlns:a16="http://schemas.microsoft.com/office/drawing/2014/main" id="{D091A2FA-272B-474F-9340-85AE86EA077B}"/>
+              </a:ext>
+            </a:extLst>
+          </p:cNvPr>
+          <p:cNvPicPr>
+            <a:picLocks noChangeAspect="1" noChangeArrowheads="1"/>
+          </p:cNvPicPr>
+          <p:nvPr/>
+        </p:nvPicPr>
+        <p:blipFill>
+          <a:blip r:embed="rId18">
+            <a:extLst>
+              <a:ext uri="{28A0092B-C50C-407E-A947-70E740481C1C}">
+                <a14:useLocalDpi xmlns:a14="http://schemas.microsoft.com/office/drawing/2010/main" val="0"/>
+              </a:ext>
+            </a:extLst>
+          </a:blip>
+          <a:srcRect/>
+          <a:stretch>
+            <a:fillRect/>
+          </a:stretch>
+        </p:blipFill>
+        <p:spPr bwMode="auto">
+          <a:xfrm>
+            <a:off x="6579764" y="4844415"/>
+            <a:ext cx="723900" cy="647700"/>
+          </a:xfrm>
+          <a:prstGeom prst="rect">
+            <a:avLst/>
+          </a:prstGeom>
+          <a:noFill/>
+          <a:extLst>
+            <a:ext uri="{909E8E84-426E-40DD-AFC4-6F175D3DCCD1}">
+              <a14:hiddenFill xmlns:a14="http://schemas.microsoft.com/office/drawing/2010/main">
+                <a:solidFill>
+                  <a:srgbClr val="FFFFFF"/>
+                </a:solidFill>
+              </a14:hiddenFill>
+            </a:ext>
+          </a:extLst>
+        </p:spPr>
+      </p:pic>
+      <p:sp>
+        <p:nvSpPr>
+          <p:cNvPr id="33" name="TextBox 16">
+            <a:extLst>
+              <a:ext uri="{FF2B5EF4-FFF2-40B4-BE49-F238E27FC236}">
+                <a16:creationId xmlns:a16="http://schemas.microsoft.com/office/drawing/2014/main" id="{33A5B379-96BF-4F27-ABA1-AC7127C5A6EF}"/>
+              </a:ext>
+            </a:extLst>
+          </p:cNvPr>
+          <p:cNvSpPr txBox="1">
+            <a:spLocks noChangeArrowheads="1"/>
+          </p:cNvSpPr>
+          <p:nvPr/>
+        </p:nvSpPr>
+        <p:spPr bwMode="auto">
+          <a:xfrm>
+            <a:off x="6405478" y="5484119"/>
+            <a:ext cx="1115568" cy="430887"/>
+          </a:xfrm>
+          <a:prstGeom prst="rect">
+            <a:avLst/>
+          </a:prstGeom>
+          <a:noFill/>
+          <a:ln>
+            <a:noFill/>
+          </a:ln>
+          <a:extLst>
+            <a:ext uri="{909E8E84-426E-40DD-AFC4-6F175D3DCCD1}">
+              <a14:hiddenFill xmlns:a14="http://schemas.microsoft.com/office/drawing/2010/main">
+                <a:solidFill>
+                  <a:srgbClr val="FFFFFF"/>
+                </a:solidFill>
+              </a14:hiddenFill>
+            </a:ext>
+            <a:ext uri="{91240B29-F687-4F45-9708-019B960494DF}">
+              <a14:hiddenLine xmlns:a14="http://schemas.microsoft.com/office/drawing/2010/main" w="9525">
+                <a:solidFill>
+                  <a:srgbClr val="000000"/>
+                </a:solidFill>
+                <a:miter lim="800000"/>
+                <a:headEnd/>
+                <a:tailEnd/>
+              </a14:hiddenLine>
+            </a:ext>
+          </a:extLst>
+        </p:spPr>
+        <p:txBody>
+          <a:bodyPr wrap="square" lIns="0" rIns="0">
+            <a:spAutoFit/>
+          </a:bodyPr>
+          <a:lstStyle>
+            <a:lvl1pPr>
+              <a:defRPr>
+                <a:solidFill>
+                  <a:schemeClr val="tx1"/>
+                </a:solidFill>
+                <a:latin typeface="Calibri" panose="020F0502020204030204" pitchFamily="34" charset="0"/>
+              </a:defRPr>
+            </a:lvl1pPr>
+            <a:lvl2pPr marL="742950" indent="-285750">
+              <a:defRPr>
+                <a:solidFill>
+                  <a:schemeClr val="tx1"/>
+                </a:solidFill>
+                <a:latin typeface="Calibri" panose="020F0502020204030204" pitchFamily="34" charset="0"/>
+              </a:defRPr>
+            </a:lvl2pPr>
+            <a:lvl3pPr marL="1143000" indent="-228600">
+              <a:defRPr>
+                <a:solidFill>
+                  <a:schemeClr val="tx1"/>
+                </a:solidFill>
+                <a:latin typeface="Calibri" panose="020F0502020204030204" pitchFamily="34" charset="0"/>
+              </a:defRPr>
+            </a:lvl3pPr>
+            <a:lvl4pPr marL="1600200" indent="-228600">
+              <a:defRPr>
+                <a:solidFill>
+                  <a:schemeClr val="tx1"/>
+                </a:solidFill>
+                <a:latin typeface="Calibri" panose="020F0502020204030204" pitchFamily="34" charset="0"/>
+              </a:defRPr>
+            </a:lvl4pPr>
+            <a:lvl5pPr marL="2057400" indent="-228600">
+              <a:defRPr>
+                <a:solidFill>
+                  <a:schemeClr val="tx1"/>
+                </a:solidFill>
+                <a:latin typeface="Calibri" panose="020F0502020204030204" pitchFamily="34" charset="0"/>
+              </a:defRPr>
+            </a:lvl5pPr>
+            <a:lvl6pPr marL="2514600" indent="-228600" eaLnBrk="0" fontAlgn="base" hangingPunct="0">
+              <a:spcBef>
+                <a:spcPct val="0"/>
+              </a:spcBef>
+              <a:spcAft>
+                <a:spcPct val="0"/>
+              </a:spcAft>
+              <a:defRPr>
+                <a:solidFill>
+                  <a:schemeClr val="tx1"/>
+                </a:solidFill>
+                <a:latin typeface="Calibri" panose="020F0502020204030204" pitchFamily="34" charset="0"/>
+              </a:defRPr>
+            </a:lvl6pPr>
+            <a:lvl7pPr marL="2971800" indent="-228600" eaLnBrk="0" fontAlgn="base" hangingPunct="0">
+              <a:spcBef>
+                <a:spcPct val="0"/>
+              </a:spcBef>
+              <a:spcAft>
+                <a:spcPct val="0"/>
+              </a:spcAft>
+              <a:defRPr>
+                <a:solidFill>
+                  <a:schemeClr val="tx1"/>
+                </a:solidFill>
+                <a:latin typeface="Calibri" panose="020F0502020204030204" pitchFamily="34" charset="0"/>
+              </a:defRPr>
+            </a:lvl7pPr>
+            <a:lvl8pPr marL="3429000" indent="-228600" eaLnBrk="0" fontAlgn="base" hangingPunct="0">
+              <a:spcBef>
+                <a:spcPct val="0"/>
+              </a:spcBef>
+              <a:spcAft>
+                <a:spcPct val="0"/>
+              </a:spcAft>
+              <a:defRPr>
+                <a:solidFill>
+                  <a:schemeClr val="tx1"/>
+                </a:solidFill>
+                <a:latin typeface="Calibri" panose="020F0502020204030204" pitchFamily="34" charset="0"/>
+              </a:defRPr>
+            </a:lvl8pPr>
+            <a:lvl9pPr marL="3886200" indent="-228600" eaLnBrk="0" fontAlgn="base" hangingPunct="0">
+              <a:spcBef>
+                <a:spcPct val="0"/>
+              </a:spcBef>
+              <a:spcAft>
+                <a:spcPct val="0"/>
+              </a:spcAft>
+              <a:defRPr>
+                <a:solidFill>
+                  <a:schemeClr val="tx1"/>
+                </a:solidFill>
+                <a:latin typeface="Calibri" panose="020F0502020204030204" pitchFamily="34" charset="0"/>
+              </a:defRPr>
+            </a:lvl9pPr>
+          </a:lstStyle>
+          <a:p>
+            <a:pPr algn="ctr" eaLnBrk="1" hangingPunct="1"/>
+            <a:r>
+              <a:rPr lang="en-US" altLang="en-US" sz="1100" dirty="0">
+                <a:latin typeface="Arial" panose="020B0604020202020204" pitchFamily="34" charset="0"/>
+                <a:ea typeface="Amazon Ember" panose="020B0603020204020204" pitchFamily="34" charset="0"/>
+                <a:cs typeface="Arial" panose="020B0604020202020204" pitchFamily="34" charset="0"/>
+              </a:rPr>
+              <a:t>F5 example application</a:t>
+            </a:r>
+          </a:p>
+        </p:txBody>
+      </p:sp>
+      <p:pic>
+        <p:nvPicPr>
+          <p:cNvPr id="1028" name="Picture 4" descr="C:\Users\annaone\AppData\Local\Temp\SNAGHTML2f53f405.PNG">
+            <a:extLst>
+              <a:ext uri="{FF2B5EF4-FFF2-40B4-BE49-F238E27FC236}">
+                <a16:creationId xmlns:a16="http://schemas.microsoft.com/office/drawing/2014/main" id="{3C2BAB01-EDA4-448E-AE45-91879345C935}"/>
+              </a:ext>
+            </a:extLst>
+          </p:cNvPr>
+          <p:cNvPicPr>
+            <a:picLocks noChangeAspect="1" noChangeArrowheads="1"/>
+          </p:cNvPicPr>
+          <p:nvPr/>
+        </p:nvPicPr>
+        <p:blipFill>
+          <a:blip r:embed="rId19">
+            <a:extLst>
+              <a:ext uri="{28A0092B-C50C-407E-A947-70E740481C1C}">
+                <a14:useLocalDpi xmlns:a14="http://schemas.microsoft.com/office/drawing/2010/main" val="0"/>
+              </a:ext>
+            </a:extLst>
+          </a:blip>
+          <a:srcRect/>
+          <a:stretch>
+            <a:fillRect/>
+          </a:stretch>
+        </p:blipFill>
+        <p:spPr bwMode="auto">
+          <a:xfrm>
+            <a:off x="6456521" y="3688479"/>
+            <a:ext cx="1077277" cy="307793"/>
+          </a:xfrm>
+          <a:prstGeom prst="rect">
+            <a:avLst/>
+          </a:prstGeom>
+          <a:noFill/>
+          <a:extLst>
+            <a:ext uri="{909E8E84-426E-40DD-AFC4-6F175D3DCCD1}">
+              <a14:hiddenFill xmlns:a14="http://schemas.microsoft.com/office/drawing/2010/main">
+                <a:solidFill>
+                  <a:srgbClr val="FFFFFF"/>
+                </a:solidFill>
+              </a14:hiddenFill>
+            </a:ext>
+          </a:extLst>
+        </p:spPr>
+      </p:pic>
+      <p:sp>
+        <p:nvSpPr>
+          <p:cNvPr id="36" name="TextBox 17">
+            <a:extLst>
+              <a:ext uri="{FF2B5EF4-FFF2-40B4-BE49-F238E27FC236}">
+                <a16:creationId xmlns:a16="http://schemas.microsoft.com/office/drawing/2014/main" id="{D8402B95-D5A4-425A-B092-048DB28F8713}"/>
+              </a:ext>
+            </a:extLst>
+          </p:cNvPr>
+          <p:cNvSpPr txBox="1">
+            <a:spLocks noChangeArrowheads="1"/>
+          </p:cNvSpPr>
+          <p:nvPr/>
+        </p:nvSpPr>
+        <p:spPr bwMode="auto">
+          <a:xfrm>
+            <a:off x="6456521" y="3963262"/>
+            <a:ext cx="1107610" cy="261610"/>
+          </a:xfrm>
+          <a:prstGeom prst="rect">
+            <a:avLst/>
+          </a:prstGeom>
+          <a:noFill/>
+          <a:ln>
+            <a:noFill/>
+          </a:ln>
+          <a:extLst>
+            <a:ext uri="{909E8E84-426E-40DD-AFC4-6F175D3DCCD1}">
+              <a14:hiddenFill xmlns:a14="http://schemas.microsoft.com/office/drawing/2010/main">
+                <a:solidFill>
+                  <a:srgbClr val="FFFFFF"/>
+                </a:solidFill>
+              </a14:hiddenFill>
+            </a:ext>
+            <a:ext uri="{91240B29-F687-4F45-9708-019B960494DF}">
+              <a14:hiddenLine xmlns:a14="http://schemas.microsoft.com/office/drawing/2010/main" w="9525">
+                <a:solidFill>
+                  <a:srgbClr val="000000"/>
+                </a:solidFill>
+                <a:miter lim="800000"/>
+                <a:headEnd/>
+                <a:tailEnd/>
+              </a14:hiddenLine>
+            </a:ext>
+          </a:extLst>
+        </p:spPr>
+        <p:txBody>
+          <a:bodyPr wrap="square">
+            <a:spAutoFit/>
+          </a:bodyPr>
+          <a:lstStyle>
+            <a:lvl1pPr>
+              <a:defRPr>
+                <a:solidFill>
+                  <a:schemeClr val="tx1"/>
+                </a:solidFill>
+                <a:latin typeface="Calibri" panose="020F0502020204030204" pitchFamily="34" charset="0"/>
+              </a:defRPr>
+            </a:lvl1pPr>
+            <a:lvl2pPr marL="742950" indent="-285750">
+              <a:defRPr>
+                <a:solidFill>
+                  <a:schemeClr val="tx1"/>
+                </a:solidFill>
+                <a:latin typeface="Calibri" panose="020F0502020204030204" pitchFamily="34" charset="0"/>
+              </a:defRPr>
+            </a:lvl2pPr>
+            <a:lvl3pPr marL="1143000" indent="-228600">
+              <a:defRPr>
+                <a:solidFill>
+                  <a:schemeClr val="tx1"/>
+                </a:solidFill>
+                <a:latin typeface="Calibri" panose="020F0502020204030204" pitchFamily="34" charset="0"/>
+              </a:defRPr>
+            </a:lvl3pPr>
+            <a:lvl4pPr marL="1600200" indent="-228600">
+              <a:defRPr>
+                <a:solidFill>
+                  <a:schemeClr val="tx1"/>
+                </a:solidFill>
+                <a:latin typeface="Calibri" panose="020F0502020204030204" pitchFamily="34" charset="0"/>
+              </a:defRPr>
+            </a:lvl4pPr>
+            <a:lvl5pPr marL="2057400" indent="-228600">
+              <a:defRPr>
+                <a:solidFill>
+                  <a:schemeClr val="tx1"/>
+                </a:solidFill>
+                <a:latin typeface="Calibri" panose="020F0502020204030204" pitchFamily="34" charset="0"/>
+              </a:defRPr>
+            </a:lvl5pPr>
+            <a:lvl6pPr marL="2514600" indent="-228600" eaLnBrk="0" fontAlgn="base" hangingPunct="0">
+              <a:spcBef>
+                <a:spcPct val="0"/>
+              </a:spcBef>
+              <a:spcAft>
+                <a:spcPct val="0"/>
+              </a:spcAft>
+              <a:defRPr>
+                <a:solidFill>
+                  <a:schemeClr val="tx1"/>
+                </a:solidFill>
+                <a:latin typeface="Calibri" panose="020F0502020204030204" pitchFamily="34" charset="0"/>
+              </a:defRPr>
+            </a:lvl6pPr>
+            <a:lvl7pPr marL="2971800" indent="-228600" eaLnBrk="0" fontAlgn="base" hangingPunct="0">
+              <a:spcBef>
+                <a:spcPct val="0"/>
+              </a:spcBef>
+              <a:spcAft>
+                <a:spcPct val="0"/>
+              </a:spcAft>
+              <a:defRPr>
+                <a:solidFill>
+                  <a:schemeClr val="tx1"/>
+                </a:solidFill>
+                <a:latin typeface="Calibri" panose="020F0502020204030204" pitchFamily="34" charset="0"/>
+              </a:defRPr>
+            </a:lvl7pPr>
+            <a:lvl8pPr marL="3429000" indent="-228600" eaLnBrk="0" fontAlgn="base" hangingPunct="0">
+              <a:spcBef>
+                <a:spcPct val="0"/>
+              </a:spcBef>
+              <a:spcAft>
+                <a:spcPct val="0"/>
+              </a:spcAft>
+              <a:defRPr>
+                <a:solidFill>
+                  <a:schemeClr val="tx1"/>
+                </a:solidFill>
+                <a:latin typeface="Calibri" panose="020F0502020204030204" pitchFamily="34" charset="0"/>
+              </a:defRPr>
+            </a:lvl8pPr>
+            <a:lvl9pPr marL="3886200" indent="-228600" eaLnBrk="0" fontAlgn="base" hangingPunct="0">
+              <a:spcBef>
+                <a:spcPct val="0"/>
+              </a:spcBef>
+              <a:spcAft>
+                <a:spcPct val="0"/>
+              </a:spcAft>
+              <a:defRPr>
+                <a:solidFill>
+                  <a:schemeClr val="tx1"/>
+                </a:solidFill>
+                <a:latin typeface="Calibri" panose="020F0502020204030204" pitchFamily="34" charset="0"/>
+              </a:defRPr>
+            </a:lvl9pPr>
+          </a:lstStyle>
+          <a:p>
+            <a:pPr algn="ctr" eaLnBrk="1" hangingPunct="1"/>
+            <a:r>
+              <a:rPr lang="en-US" altLang="en-US" sz="1100" dirty="0">
+                <a:latin typeface="Arial" panose="020B0604020202020204" pitchFamily="34" charset="0"/>
+                <a:ea typeface="Amazon Ember" panose="020B0603020204020204" pitchFamily="34" charset="0"/>
+                <a:cs typeface="Arial" panose="020B0604020202020204" pitchFamily="34" charset="0"/>
+              </a:rPr>
+              <a:t>NIC</a:t>
+            </a:r>
           </a:p>
         </p:txBody>
       </p:sp>

</xml_diff>

<commit_message>
Edits to deployment guide
</commit_message>
<xml_diff>
--- a/docs/deployment_guide/images/f5-big-ip-virtual-edition-architecture-diagram.pptx
+++ b/docs/deployment_guide/images/f5-big-ip-virtual-edition-architecture-diagram.pptx
@@ -224,7 +224,7 @@
           <a:p>
             <a:fld id="{49A7721D-1176-A640-AC48-B82F78C92D56}" type="datetimeFigureOut">
               <a:rPr lang="en-US" smtClean="0"/>
-              <a:t>5/26/2022</a:t>
+              <a:t>6/8/2022</a:t>
             </a:fld>
             <a:endParaRPr lang="en-US" dirty="0"/>
           </a:p>
@@ -401,7 +401,7 @@
           <a:p>
             <a:fld id="{C884A089-FB25-6D46-9D21-F0F04A18BCA8}" type="datetimeFigureOut">
               <a:rPr lang="en-US" smtClean="0"/>
-              <a:t>5/26/2022</a:t>
+              <a:t>6/8/2022</a:t>
             </a:fld>
             <a:endParaRPr lang="en-US" dirty="0"/>
           </a:p>
@@ -1033,7 +1033,7 @@
           <a:p>
             <a:fld id="{C764DE79-268F-4C1A-8933-263129D2AF90}" type="datetimeFigureOut">
               <a:rPr lang="en-US" dirty="0"/>
-              <a:t>5/26/2022</a:t>
+              <a:t>6/8/2022</a:t>
             </a:fld>
             <a:endParaRPr lang="en-US" dirty="0"/>
           </a:p>
@@ -1204,7 +1204,7 @@
           <a:p>
             <a:fld id="{C764DE79-268F-4C1A-8933-263129D2AF90}" type="datetimeFigureOut">
               <a:rPr lang="en-US" dirty="0"/>
-              <a:t>5/26/2022</a:t>
+              <a:t>6/8/2022</a:t>
             </a:fld>
             <a:endParaRPr lang="en-US" dirty="0"/>
           </a:p>
@@ -1385,7 +1385,7 @@
           <a:p>
             <a:fld id="{C764DE79-268F-4C1A-8933-263129D2AF90}" type="datetimeFigureOut">
               <a:rPr lang="en-US" dirty="0"/>
-              <a:t>5/26/2022</a:t>
+              <a:t>6/8/2022</a:t>
             </a:fld>
             <a:endParaRPr lang="en-US" dirty="0"/>
           </a:p>
@@ -1578,7 +1578,7 @@
           <a:p>
             <a:fld id="{C764DE79-268F-4C1A-8933-263129D2AF90}" type="datetimeFigureOut">
               <a:rPr lang="en-US" dirty="0"/>
-              <a:t>5/26/2022</a:t>
+              <a:t>6/8/2022</a:t>
             </a:fld>
             <a:endParaRPr lang="en-US" dirty="0"/>
           </a:p>
@@ -1749,7 +1749,7 @@
           <a:p>
             <a:fld id="{C764DE79-268F-4C1A-8933-263129D2AF90}" type="datetimeFigureOut">
               <a:rPr lang="en-US" dirty="0"/>
-              <a:t>5/26/2022</a:t>
+              <a:t>6/8/2022</a:t>
             </a:fld>
             <a:endParaRPr lang="en-US" dirty="0"/>
           </a:p>
@@ -1994,7 +1994,7 @@
           <a:p>
             <a:fld id="{C764DE79-268F-4C1A-8933-263129D2AF90}" type="datetimeFigureOut">
               <a:rPr lang="en-US" dirty="0"/>
-              <a:t>5/26/2022</a:t>
+              <a:t>6/8/2022</a:t>
             </a:fld>
             <a:endParaRPr lang="en-US" dirty="0"/>
           </a:p>
@@ -2227,7 +2227,7 @@
           <a:p>
             <a:fld id="{C764DE79-268F-4C1A-8933-263129D2AF90}" type="datetimeFigureOut">
               <a:rPr lang="en-US" dirty="0"/>
-              <a:t>5/26/2022</a:t>
+              <a:t>6/8/2022</a:t>
             </a:fld>
             <a:endParaRPr lang="en-US" dirty="0"/>
           </a:p>
@@ -2595,7 +2595,7 @@
           <a:p>
             <a:fld id="{C764DE79-268F-4C1A-8933-263129D2AF90}" type="datetimeFigureOut">
               <a:rPr lang="en-US" dirty="0"/>
-              <a:t>5/26/2022</a:t>
+              <a:t>6/8/2022</a:t>
             </a:fld>
             <a:endParaRPr lang="en-US" dirty="0"/>
           </a:p>
@@ -2714,7 +2714,7 @@
           <a:p>
             <a:fld id="{C764DE79-268F-4C1A-8933-263129D2AF90}" type="datetimeFigureOut">
               <a:rPr lang="en-US" dirty="0"/>
-              <a:t>5/26/2022</a:t>
+              <a:t>6/8/2022</a:t>
             </a:fld>
             <a:endParaRPr lang="en-US" dirty="0"/>
           </a:p>
@@ -3083,7 +3083,7 @@
           <a:p>
             <a:fld id="{C764DE79-268F-4C1A-8933-263129D2AF90}" type="datetimeFigureOut">
               <a:rPr lang="en-US" dirty="0"/>
-              <a:t>5/26/2022</a:t>
+              <a:t>6/8/2022</a:t>
             </a:fld>
             <a:endParaRPr lang="en-US" dirty="0"/>
           </a:p>
@@ -3617,7 +3617,7 @@
           <a:p>
             <a:fld id="{C764DE79-268F-4C1A-8933-263129D2AF90}" type="datetimeFigureOut">
               <a:rPr lang="en-US" dirty="0"/>
-              <a:t>5/26/2022</a:t>
+              <a:t>6/8/2022</a:t>
             </a:fld>
             <a:endParaRPr lang="en-US" dirty="0"/>
           </a:p>
@@ -4037,8 +4037,8 @@
         </p:nvSpPr>
         <p:spPr>
           <a:xfrm>
-            <a:off x="2011680" y="1463040"/>
-            <a:ext cx="9966960" cy="5486400"/>
+            <a:off x="2011680" y="1463039"/>
+            <a:ext cx="10875645" cy="5318761"/>
           </a:xfrm>
           <a:prstGeom prst="rect">
             <a:avLst/>
@@ -4106,8 +4106,8 @@
         </p:nvSpPr>
         <p:spPr>
           <a:xfrm>
-            <a:off x="2560320" y="2011680"/>
-            <a:ext cx="8138160" cy="4480560"/>
+            <a:off x="2560319" y="2011679"/>
+            <a:ext cx="10157045" cy="4503421"/>
           </a:xfrm>
           <a:prstGeom prst="rect">
             <a:avLst/>
@@ -4176,8 +4176,8 @@
         </p:nvSpPr>
         <p:spPr>
           <a:xfrm>
-            <a:off x="3749040" y="4389120"/>
-            <a:ext cx="2194560" cy="1828800"/>
+            <a:off x="3749040" y="4842599"/>
+            <a:ext cx="2674832" cy="1541145"/>
           </a:xfrm>
           <a:prstGeom prst="rect">
             <a:avLst/>
@@ -4242,8 +4242,8 @@
         </p:nvSpPr>
         <p:spPr>
           <a:xfrm>
-            <a:off x="3749040" y="2286000"/>
-            <a:ext cx="2194560" cy="1938872"/>
+            <a:off x="3749040" y="2162175"/>
+            <a:ext cx="2674832" cy="2481120"/>
           </a:xfrm>
           <a:prstGeom prst="rect">
             <a:avLst/>
@@ -4310,7 +4310,7 @@
         </p:nvSpPr>
         <p:spPr bwMode="auto">
           <a:xfrm>
-            <a:off x="3726066" y="3267090"/>
+            <a:off x="3726066" y="3133740"/>
             <a:ext cx="1234766" cy="261610"/>
           </a:xfrm>
           <a:prstGeom prst="rect">
@@ -4484,7 +4484,7 @@
         </p:blipFill>
         <p:spPr bwMode="auto">
           <a:xfrm>
-            <a:off x="4114800" y="2807970"/>
+            <a:off x="4114800" y="2674620"/>
             <a:ext cx="457200" cy="457200"/>
           </a:xfrm>
           <a:prstGeom prst="rect">
@@ -4543,7 +4543,7 @@
         </p:blipFill>
         <p:spPr>
           <a:xfrm>
-            <a:off x="3749040" y="2286000"/>
+            <a:off x="3749040" y="2152650"/>
             <a:ext cx="381000" cy="381000"/>
           </a:xfrm>
           <a:prstGeom prst="rect">
@@ -4579,7 +4579,7 @@
         </p:blipFill>
         <p:spPr>
           <a:xfrm>
-            <a:off x="3749040" y="4389120"/>
+            <a:off x="3749040" y="4842599"/>
             <a:ext cx="381000" cy="381000"/>
           </a:xfrm>
           <a:prstGeom prst="rect">
@@ -4602,7 +4602,7 @@
         <p:spPr>
           <a:xfrm>
             <a:off x="3474720" y="1645920"/>
-            <a:ext cx="2743200" cy="5120640"/>
+            <a:ext cx="3170104" cy="4996180"/>
           </a:xfrm>
           <a:prstGeom prst="rect">
             <a:avLst/>
@@ -4693,7 +4693,7 @@
         </p:blipFill>
         <p:spPr bwMode="auto">
           <a:xfrm>
-            <a:off x="10972800" y="2011680"/>
+            <a:off x="11642783" y="2465634"/>
             <a:ext cx="762000" cy="762000"/>
           </a:xfrm>
           <a:prstGeom prst="rect">
@@ -4740,7 +4740,7 @@
         </p:nvSpPr>
         <p:spPr bwMode="auto">
           <a:xfrm>
-            <a:off x="10751820" y="2775585"/>
+            <a:off x="11444609" y="3284397"/>
             <a:ext cx="1204595" cy="276999"/>
           </a:xfrm>
           <a:prstGeom prst="rect">
@@ -4875,18 +4875,13 @@
           <a:p>
             <a:pPr algn="ctr" eaLnBrk="1" hangingPunct="1"/>
             <a:r>
-              <a:rPr lang="en-US" altLang="en-US" sz="1200">
+              <a:rPr lang="en-US" altLang="en-US" sz="1200" dirty="0">
                 <a:latin typeface="Arial" panose="020B0604020202020204" pitchFamily="34" charset="0"/>
                 <a:ea typeface="Amazon Ember" panose="020B0603020204020204" pitchFamily="34" charset="0"/>
                 <a:cs typeface="Arial" panose="020B0604020202020204" pitchFamily="34" charset="0"/>
               </a:rPr>
               <a:t>Amazon S3</a:t>
             </a:r>
-            <a:endParaRPr lang="en-US" altLang="en-US" sz="1200" dirty="0">
-              <a:latin typeface="Arial" panose="020B0604020202020204" pitchFamily="34" charset="0"/>
-              <a:ea typeface="Amazon Ember" panose="020B0603020204020204" pitchFamily="34" charset="0"/>
-              <a:cs typeface="Arial" panose="020B0604020202020204" pitchFamily="34" charset="0"/>
-            </a:endParaRPr>
           </a:p>
         </p:txBody>
       </p:sp>
@@ -4919,7 +4914,7 @@
         </p:blipFill>
         <p:spPr bwMode="auto">
           <a:xfrm>
-            <a:off x="5208604" y="2807970"/>
+            <a:off x="5477086" y="2685484"/>
             <a:ext cx="457200" cy="457200"/>
           </a:xfrm>
           <a:prstGeom prst="rect">
@@ -4966,7 +4961,7 @@
         </p:nvSpPr>
         <p:spPr bwMode="auto">
           <a:xfrm>
-            <a:off x="4941993" y="3266714"/>
+            <a:off x="5198873" y="3133364"/>
             <a:ext cx="992293" cy="261610"/>
           </a:xfrm>
           <a:prstGeom prst="rect">
@@ -5101,18 +5096,13 @@
           <a:p>
             <a:pPr algn="ctr" eaLnBrk="1" hangingPunct="1"/>
             <a:r>
-              <a:rPr lang="en-US" altLang="en-US" sz="1100">
+              <a:rPr lang="en-US" altLang="en-US" sz="1100" dirty="0">
                 <a:latin typeface="Arial" panose="020B0604020202020204" pitchFamily="34" charset="0"/>
                 <a:ea typeface="Amazon Ember" panose="020B0603020204020204" pitchFamily="34" charset="0"/>
                 <a:cs typeface="Arial" panose="020B0604020202020204" pitchFamily="34" charset="0"/>
               </a:rPr>
               <a:t>Bastion host</a:t>
             </a:r>
-            <a:endParaRPr lang="en-US" altLang="en-US" sz="1100" dirty="0">
-              <a:latin typeface="Arial" panose="020B0604020202020204" pitchFamily="34" charset="0"/>
-              <a:ea typeface="Amazon Ember" panose="020B0603020204020204" pitchFamily="34" charset="0"/>
-              <a:cs typeface="Arial" panose="020B0604020202020204" pitchFamily="34" charset="0"/>
-            </a:endParaRPr>
           </a:p>
         </p:txBody>
       </p:sp>
@@ -5130,8 +5120,8 @@
         </p:nvSpPr>
         <p:spPr>
           <a:xfrm>
-            <a:off x="7955280" y="4389120"/>
-            <a:ext cx="2194560" cy="1828800"/>
+            <a:off x="8419322" y="4864904"/>
+            <a:ext cx="2679192" cy="1545336"/>
           </a:xfrm>
           <a:prstGeom prst="rect">
             <a:avLst/>
@@ -5196,8 +5186,8 @@
         </p:nvSpPr>
         <p:spPr>
           <a:xfrm>
-            <a:off x="7955280" y="2286000"/>
-            <a:ext cx="2194560" cy="1920240"/>
+            <a:off x="8414952" y="2162175"/>
+            <a:ext cx="2679192" cy="2481120"/>
           </a:xfrm>
           <a:prstGeom prst="rect">
             <a:avLst/>
@@ -5264,7 +5254,7 @@
         </p:nvSpPr>
         <p:spPr bwMode="auto">
           <a:xfrm>
-            <a:off x="9094470" y="3268980"/>
+            <a:off x="9886163" y="3145519"/>
             <a:ext cx="1107610" cy="261610"/>
           </a:xfrm>
           <a:prstGeom prst="rect">
@@ -5438,7 +5428,7 @@
         </p:blipFill>
         <p:spPr bwMode="auto">
           <a:xfrm>
-            <a:off x="9418320" y="2807970"/>
+            <a:off x="10269571" y="2674620"/>
             <a:ext cx="457200" cy="457200"/>
           </a:xfrm>
           <a:prstGeom prst="rect">
@@ -5497,7 +5487,7 @@
         </p:blipFill>
         <p:spPr>
           <a:xfrm>
-            <a:off x="7955280" y="2286000"/>
+            <a:off x="8399331" y="2162175"/>
             <a:ext cx="381000" cy="381000"/>
           </a:xfrm>
           <a:prstGeom prst="rect">
@@ -5533,7 +5523,7 @@
         </p:blipFill>
         <p:spPr>
           <a:xfrm>
-            <a:off x="7955280" y="4389120"/>
+            <a:off x="8414952" y="4871091"/>
             <a:ext cx="381000" cy="381000"/>
           </a:xfrm>
           <a:prstGeom prst="rect">
@@ -5555,8 +5545,8 @@
         </p:nvSpPr>
         <p:spPr>
           <a:xfrm>
-            <a:off x="7680960" y="1645920"/>
-            <a:ext cx="2743200" cy="5120640"/>
+            <a:off x="8174595" y="1645920"/>
+            <a:ext cx="3185761" cy="4996180"/>
           </a:xfrm>
           <a:prstGeom prst="rect">
             <a:avLst/>
@@ -5656,7 +5646,7 @@
         </p:blipFill>
         <p:spPr bwMode="auto">
           <a:xfrm>
-            <a:off x="8229600" y="2807970"/>
+            <a:off x="8905687" y="2674620"/>
             <a:ext cx="457200" cy="457200"/>
           </a:xfrm>
           <a:prstGeom prst="rect">
@@ -5703,7 +5693,7 @@
         </p:nvSpPr>
         <p:spPr bwMode="auto">
           <a:xfrm>
-            <a:off x="8051123" y="3270524"/>
+            <a:off x="8725068" y="3142684"/>
             <a:ext cx="818726" cy="261610"/>
           </a:xfrm>
           <a:prstGeom prst="rect">
@@ -5838,18 +5828,13 @@
           <a:p>
             <a:pPr algn="ctr" eaLnBrk="1" hangingPunct="1"/>
             <a:r>
-              <a:rPr lang="en-US" altLang="en-US" sz="1100">
+              <a:rPr lang="en-US" altLang="en-US" sz="1100" dirty="0">
                 <a:latin typeface="Arial" panose="020B0604020202020204" pitchFamily="34" charset="0"/>
                 <a:ea typeface="Amazon Ember" panose="020B0603020204020204" pitchFamily="34" charset="0"/>
                 <a:cs typeface="Arial" panose="020B0604020202020204" pitchFamily="34" charset="0"/>
               </a:rPr>
               <a:t>Bastion host</a:t>
             </a:r>
-            <a:endParaRPr lang="en-US" altLang="en-US" sz="1100" dirty="0">
-              <a:latin typeface="Arial" panose="020B0604020202020204" pitchFamily="34" charset="0"/>
-              <a:ea typeface="Amazon Ember" panose="020B0603020204020204" pitchFamily="34" charset="0"/>
-              <a:cs typeface="Arial" panose="020B0604020202020204" pitchFamily="34" charset="0"/>
-            </a:endParaRPr>
           </a:p>
         </p:txBody>
       </p:sp>
@@ -5867,8 +5852,8 @@
         </p:nvSpPr>
         <p:spPr>
           <a:xfrm>
-            <a:off x="4937760" y="2625090"/>
-            <a:ext cx="4114800" cy="1005840"/>
+            <a:off x="5023377" y="2596712"/>
+            <a:ext cx="4781278" cy="937918"/>
           </a:xfrm>
           <a:prstGeom prst="rect">
             <a:avLst/>
@@ -5987,7 +5972,7 @@
         </p:blipFill>
         <p:spPr>
           <a:xfrm>
-            <a:off x="6806198" y="2621280"/>
+            <a:off x="7223516" y="2607946"/>
             <a:ext cx="381000" cy="381000"/>
           </a:xfrm>
           <a:prstGeom prst="rect">
@@ -6024,7 +6009,7 @@
         </p:blipFill>
         <p:spPr bwMode="auto">
           <a:xfrm>
-            <a:off x="4572000" y="5029200"/>
+            <a:off x="5459884" y="3685900"/>
             <a:ext cx="457200" cy="457200"/>
           </a:xfrm>
           <a:prstGeom prst="rect">
@@ -6071,7 +6056,7 @@
         </p:nvSpPr>
         <p:spPr bwMode="auto">
           <a:xfrm>
-            <a:off x="4244430" y="5487929"/>
+            <a:off x="5108020" y="4155906"/>
             <a:ext cx="1115568" cy="430887"/>
           </a:xfrm>
           <a:prstGeom prst="rect">
@@ -6245,7 +6230,7 @@
         </p:blipFill>
         <p:spPr bwMode="auto">
           <a:xfrm>
-            <a:off x="8869680" y="5026919"/>
+            <a:off x="15611385" y="7492365"/>
             <a:ext cx="457200" cy="457200"/>
           </a:xfrm>
           <a:prstGeom prst="rect">
@@ -6363,7 +6348,7 @@
         </p:nvSpPr>
         <p:spPr bwMode="auto">
           <a:xfrm>
-            <a:off x="8549852" y="5479755"/>
+            <a:off x="15291557" y="7945201"/>
             <a:ext cx="1115568" cy="430887"/>
           </a:xfrm>
           <a:prstGeom prst="rect">
@@ -6508,12 +6493,334 @@
           </a:p>
         </p:txBody>
       </p:sp>
+      <p:sp>
+        <p:nvSpPr>
+          <p:cNvPr id="33" name="TextBox 16">
+            <a:extLst>
+              <a:ext uri="{FF2B5EF4-FFF2-40B4-BE49-F238E27FC236}">
+                <a16:creationId xmlns:a16="http://schemas.microsoft.com/office/drawing/2014/main" id="{33A5B379-96BF-4F27-ABA1-AC7127C5A6EF}"/>
+              </a:ext>
+            </a:extLst>
+          </p:cNvPr>
+          <p:cNvSpPr txBox="1">
+            <a:spLocks noChangeArrowheads="1"/>
+          </p:cNvSpPr>
+          <p:nvPr/>
+        </p:nvSpPr>
+        <p:spPr bwMode="auto">
+          <a:xfrm>
+            <a:off x="3741836" y="5791904"/>
+            <a:ext cx="1115568" cy="430887"/>
+          </a:xfrm>
+          <a:prstGeom prst="rect">
+            <a:avLst/>
+          </a:prstGeom>
+          <a:noFill/>
+          <a:ln>
+            <a:noFill/>
+          </a:ln>
+          <a:extLst>
+            <a:ext uri="{909E8E84-426E-40DD-AFC4-6F175D3DCCD1}">
+              <a14:hiddenFill xmlns:a14="http://schemas.microsoft.com/office/drawing/2010/main">
+                <a:solidFill>
+                  <a:srgbClr val="FFFFFF"/>
+                </a:solidFill>
+              </a14:hiddenFill>
+            </a:ext>
+            <a:ext uri="{91240B29-F687-4F45-9708-019B960494DF}">
+              <a14:hiddenLine xmlns:a14="http://schemas.microsoft.com/office/drawing/2010/main" w="9525">
+                <a:solidFill>
+                  <a:srgbClr val="000000"/>
+                </a:solidFill>
+                <a:miter lim="800000"/>
+                <a:headEnd/>
+                <a:tailEnd/>
+              </a14:hiddenLine>
+            </a:ext>
+          </a:extLst>
+        </p:spPr>
+        <p:txBody>
+          <a:bodyPr wrap="square" lIns="0" rIns="0">
+            <a:spAutoFit/>
+          </a:bodyPr>
+          <a:lstStyle>
+            <a:lvl1pPr>
+              <a:defRPr>
+                <a:solidFill>
+                  <a:schemeClr val="tx1"/>
+                </a:solidFill>
+                <a:latin typeface="Calibri" panose="020F0502020204030204" pitchFamily="34" charset="0"/>
+              </a:defRPr>
+            </a:lvl1pPr>
+            <a:lvl2pPr marL="742950" indent="-285750">
+              <a:defRPr>
+                <a:solidFill>
+                  <a:schemeClr val="tx1"/>
+                </a:solidFill>
+                <a:latin typeface="Calibri" panose="020F0502020204030204" pitchFamily="34" charset="0"/>
+              </a:defRPr>
+            </a:lvl2pPr>
+            <a:lvl3pPr marL="1143000" indent="-228600">
+              <a:defRPr>
+                <a:solidFill>
+                  <a:schemeClr val="tx1"/>
+                </a:solidFill>
+                <a:latin typeface="Calibri" panose="020F0502020204030204" pitchFamily="34" charset="0"/>
+              </a:defRPr>
+            </a:lvl3pPr>
+            <a:lvl4pPr marL="1600200" indent="-228600">
+              <a:defRPr>
+                <a:solidFill>
+                  <a:schemeClr val="tx1"/>
+                </a:solidFill>
+                <a:latin typeface="Calibri" panose="020F0502020204030204" pitchFamily="34" charset="0"/>
+              </a:defRPr>
+            </a:lvl4pPr>
+            <a:lvl5pPr marL="2057400" indent="-228600">
+              <a:defRPr>
+                <a:solidFill>
+                  <a:schemeClr val="tx1"/>
+                </a:solidFill>
+                <a:latin typeface="Calibri" panose="020F0502020204030204" pitchFamily="34" charset="0"/>
+              </a:defRPr>
+            </a:lvl5pPr>
+            <a:lvl6pPr marL="2514600" indent="-228600" eaLnBrk="0" fontAlgn="base" hangingPunct="0">
+              <a:spcBef>
+                <a:spcPct val="0"/>
+              </a:spcBef>
+              <a:spcAft>
+                <a:spcPct val="0"/>
+              </a:spcAft>
+              <a:defRPr>
+                <a:solidFill>
+                  <a:schemeClr val="tx1"/>
+                </a:solidFill>
+                <a:latin typeface="Calibri" panose="020F0502020204030204" pitchFamily="34" charset="0"/>
+              </a:defRPr>
+            </a:lvl6pPr>
+            <a:lvl7pPr marL="2971800" indent="-228600" eaLnBrk="0" fontAlgn="base" hangingPunct="0">
+              <a:spcBef>
+                <a:spcPct val="0"/>
+              </a:spcBef>
+              <a:spcAft>
+                <a:spcPct val="0"/>
+              </a:spcAft>
+              <a:defRPr>
+                <a:solidFill>
+                  <a:schemeClr val="tx1"/>
+                </a:solidFill>
+                <a:latin typeface="Calibri" panose="020F0502020204030204" pitchFamily="34" charset="0"/>
+              </a:defRPr>
+            </a:lvl7pPr>
+            <a:lvl8pPr marL="3429000" indent="-228600" eaLnBrk="0" fontAlgn="base" hangingPunct="0">
+              <a:spcBef>
+                <a:spcPct val="0"/>
+              </a:spcBef>
+              <a:spcAft>
+                <a:spcPct val="0"/>
+              </a:spcAft>
+              <a:defRPr>
+                <a:solidFill>
+                  <a:schemeClr val="tx1"/>
+                </a:solidFill>
+                <a:latin typeface="Calibri" panose="020F0502020204030204" pitchFamily="34" charset="0"/>
+              </a:defRPr>
+            </a:lvl8pPr>
+            <a:lvl9pPr marL="3886200" indent="-228600" eaLnBrk="0" fontAlgn="base" hangingPunct="0">
+              <a:spcBef>
+                <a:spcPct val="0"/>
+              </a:spcBef>
+              <a:spcAft>
+                <a:spcPct val="0"/>
+              </a:spcAft>
+              <a:defRPr>
+                <a:solidFill>
+                  <a:schemeClr val="tx1"/>
+                </a:solidFill>
+                <a:latin typeface="Calibri" panose="020F0502020204030204" pitchFamily="34" charset="0"/>
+              </a:defRPr>
+            </a:lvl9pPr>
+          </a:lstStyle>
+          <a:p>
+            <a:pPr algn="ctr" eaLnBrk="1" hangingPunct="1"/>
+            <a:r>
+              <a:rPr lang="en-US" altLang="en-US" sz="1100" dirty="0">
+                <a:latin typeface="Arial" panose="020B0604020202020204" pitchFamily="34" charset="0"/>
+                <a:ea typeface="Amazon Ember" panose="020B0603020204020204" pitchFamily="34" charset="0"/>
+                <a:cs typeface="Arial" panose="020B0604020202020204" pitchFamily="34" charset="0"/>
+              </a:rPr>
+              <a:t>F5 example application</a:t>
+            </a:r>
+          </a:p>
+        </p:txBody>
+      </p:sp>
+      <p:sp>
+        <p:nvSpPr>
+          <p:cNvPr id="40" name="TextBox 16">
+            <a:extLst>
+              <a:ext uri="{FF2B5EF4-FFF2-40B4-BE49-F238E27FC236}">
+                <a16:creationId xmlns:a16="http://schemas.microsoft.com/office/drawing/2014/main" id="{D03DC726-36ED-4041-B9EA-046153E22781}"/>
+              </a:ext>
+            </a:extLst>
+          </p:cNvPr>
+          <p:cNvSpPr txBox="1">
+            <a:spLocks noChangeArrowheads="1"/>
+          </p:cNvSpPr>
+          <p:nvPr/>
+        </p:nvSpPr>
+        <p:spPr bwMode="auto">
+          <a:xfrm>
+            <a:off x="8481309" y="5817324"/>
+            <a:ext cx="1115568" cy="430887"/>
+          </a:xfrm>
+          <a:prstGeom prst="rect">
+            <a:avLst/>
+          </a:prstGeom>
+          <a:noFill/>
+          <a:ln>
+            <a:noFill/>
+          </a:ln>
+          <a:extLst>
+            <a:ext uri="{909E8E84-426E-40DD-AFC4-6F175D3DCCD1}">
+              <a14:hiddenFill xmlns:a14="http://schemas.microsoft.com/office/drawing/2010/main">
+                <a:solidFill>
+                  <a:srgbClr val="FFFFFF"/>
+                </a:solidFill>
+              </a14:hiddenFill>
+            </a:ext>
+            <a:ext uri="{91240B29-F687-4F45-9708-019B960494DF}">
+              <a14:hiddenLine xmlns:a14="http://schemas.microsoft.com/office/drawing/2010/main" w="9525">
+                <a:solidFill>
+                  <a:srgbClr val="000000"/>
+                </a:solidFill>
+                <a:miter lim="800000"/>
+                <a:headEnd/>
+                <a:tailEnd/>
+              </a14:hiddenLine>
+            </a:ext>
+          </a:extLst>
+        </p:spPr>
+        <p:txBody>
+          <a:bodyPr wrap="square" lIns="0" rIns="0">
+            <a:spAutoFit/>
+          </a:bodyPr>
+          <a:lstStyle>
+            <a:lvl1pPr>
+              <a:defRPr>
+                <a:solidFill>
+                  <a:schemeClr val="tx1"/>
+                </a:solidFill>
+                <a:latin typeface="Calibri" panose="020F0502020204030204" pitchFamily="34" charset="0"/>
+              </a:defRPr>
+            </a:lvl1pPr>
+            <a:lvl2pPr marL="742950" indent="-285750">
+              <a:defRPr>
+                <a:solidFill>
+                  <a:schemeClr val="tx1"/>
+                </a:solidFill>
+                <a:latin typeface="Calibri" panose="020F0502020204030204" pitchFamily="34" charset="0"/>
+              </a:defRPr>
+            </a:lvl2pPr>
+            <a:lvl3pPr marL="1143000" indent="-228600">
+              <a:defRPr>
+                <a:solidFill>
+                  <a:schemeClr val="tx1"/>
+                </a:solidFill>
+                <a:latin typeface="Calibri" panose="020F0502020204030204" pitchFamily="34" charset="0"/>
+              </a:defRPr>
+            </a:lvl3pPr>
+            <a:lvl4pPr marL="1600200" indent="-228600">
+              <a:defRPr>
+                <a:solidFill>
+                  <a:schemeClr val="tx1"/>
+                </a:solidFill>
+                <a:latin typeface="Calibri" panose="020F0502020204030204" pitchFamily="34" charset="0"/>
+              </a:defRPr>
+            </a:lvl4pPr>
+            <a:lvl5pPr marL="2057400" indent="-228600">
+              <a:defRPr>
+                <a:solidFill>
+                  <a:schemeClr val="tx1"/>
+                </a:solidFill>
+                <a:latin typeface="Calibri" panose="020F0502020204030204" pitchFamily="34" charset="0"/>
+              </a:defRPr>
+            </a:lvl5pPr>
+            <a:lvl6pPr marL="2514600" indent="-228600" eaLnBrk="0" fontAlgn="base" hangingPunct="0">
+              <a:spcBef>
+                <a:spcPct val="0"/>
+              </a:spcBef>
+              <a:spcAft>
+                <a:spcPct val="0"/>
+              </a:spcAft>
+              <a:defRPr>
+                <a:solidFill>
+                  <a:schemeClr val="tx1"/>
+                </a:solidFill>
+                <a:latin typeface="Calibri" panose="020F0502020204030204" pitchFamily="34" charset="0"/>
+              </a:defRPr>
+            </a:lvl6pPr>
+            <a:lvl7pPr marL="2971800" indent="-228600" eaLnBrk="0" fontAlgn="base" hangingPunct="0">
+              <a:spcBef>
+                <a:spcPct val="0"/>
+              </a:spcBef>
+              <a:spcAft>
+                <a:spcPct val="0"/>
+              </a:spcAft>
+              <a:defRPr>
+                <a:solidFill>
+                  <a:schemeClr val="tx1"/>
+                </a:solidFill>
+                <a:latin typeface="Calibri" panose="020F0502020204030204" pitchFamily="34" charset="0"/>
+              </a:defRPr>
+            </a:lvl7pPr>
+            <a:lvl8pPr marL="3429000" indent="-228600" eaLnBrk="0" fontAlgn="base" hangingPunct="0">
+              <a:spcBef>
+                <a:spcPct val="0"/>
+              </a:spcBef>
+              <a:spcAft>
+                <a:spcPct val="0"/>
+              </a:spcAft>
+              <a:defRPr>
+                <a:solidFill>
+                  <a:schemeClr val="tx1"/>
+                </a:solidFill>
+                <a:latin typeface="Calibri" panose="020F0502020204030204" pitchFamily="34" charset="0"/>
+              </a:defRPr>
+            </a:lvl8pPr>
+            <a:lvl9pPr marL="3886200" indent="-228600" eaLnBrk="0" fontAlgn="base" hangingPunct="0">
+              <a:spcBef>
+                <a:spcPct val="0"/>
+              </a:spcBef>
+              <a:spcAft>
+                <a:spcPct val="0"/>
+              </a:spcAft>
+              <a:defRPr>
+                <a:solidFill>
+                  <a:schemeClr val="tx1"/>
+                </a:solidFill>
+                <a:latin typeface="Calibri" panose="020F0502020204030204" pitchFamily="34" charset="0"/>
+              </a:defRPr>
+            </a:lvl9pPr>
+          </a:lstStyle>
+          <a:p>
+            <a:pPr algn="ctr" eaLnBrk="1" hangingPunct="1"/>
+            <a:r>
+              <a:rPr lang="en-US" altLang="en-US" sz="1100" dirty="0">
+                <a:latin typeface="Arial" panose="020B0604020202020204" pitchFamily="34" charset="0"/>
+                <a:ea typeface="Amazon Ember" panose="020B0603020204020204" pitchFamily="34" charset="0"/>
+                <a:cs typeface="Arial" panose="020B0604020202020204" pitchFamily="34" charset="0"/>
+              </a:rPr>
+              <a:t>F5 example application</a:t>
+            </a:r>
+          </a:p>
+        </p:txBody>
+      </p:sp>
       <p:pic>
         <p:nvPicPr>
-          <p:cNvPr id="1026" name="Picture 2" descr="C:\Users\annaone\AppData\Local\Temp\SNAGHTML2f497b0d.PNG">
+          <p:cNvPr id="75" name="Graphic 13">
             <a:extLst>
               <a:ext uri="{FF2B5EF4-FFF2-40B4-BE49-F238E27FC236}">
-                <a16:creationId xmlns:a16="http://schemas.microsoft.com/office/drawing/2014/main" id="{D091A2FA-272B-474F-9340-85AE86EA077B}"/>
+                <a16:creationId xmlns:a16="http://schemas.microsoft.com/office/drawing/2014/main" id="{F2461B76-24D5-4ED9-856E-2CC4ED93A597}"/>
               </a:ext>
             </a:extLst>
           </p:cNvPr>
@@ -6537,13 +6844,16 @@
         </p:blipFill>
         <p:spPr bwMode="auto">
           <a:xfrm>
-            <a:off x="6579764" y="4844415"/>
-            <a:ext cx="723900" cy="647700"/>
+            <a:off x="4052550" y="5344775"/>
+            <a:ext cx="469900" cy="469900"/>
           </a:xfrm>
           <a:prstGeom prst="rect">
             <a:avLst/>
           </a:prstGeom>
           <a:noFill/>
+          <a:ln>
+            <a:noFill/>
+          </a:ln>
           <a:extLst>
             <a:ext uri="{909E8E84-426E-40DD-AFC4-6F175D3DCCD1}">
               <a14:hiddenFill xmlns:a14="http://schemas.microsoft.com/office/drawing/2010/main">
@@ -6551,16 +6861,146 @@
                   <a:srgbClr val="FFFFFF"/>
                 </a:solidFill>
               </a14:hiddenFill>
+            </a:ext>
+            <a:ext uri="{91240B29-F687-4F45-9708-019B960494DF}">
+              <a14:hiddenLine xmlns:a14="http://schemas.microsoft.com/office/drawing/2010/main" w="9525">
+                <a:solidFill>
+                  <a:srgbClr val="000000"/>
+                </a:solidFill>
+                <a:miter lim="800000"/>
+                <a:headEnd/>
+                <a:tailEnd/>
+              </a14:hiddenLine>
             </a:ext>
           </a:extLst>
         </p:spPr>
       </p:pic>
-      <p:sp>
-        <p:nvSpPr>
-          <p:cNvPr id="33" name="TextBox 16">
+      <p:pic>
+        <p:nvPicPr>
+          <p:cNvPr id="76" name="Graphic 13">
             <a:extLst>
               <a:ext uri="{FF2B5EF4-FFF2-40B4-BE49-F238E27FC236}">
-                <a16:creationId xmlns:a16="http://schemas.microsoft.com/office/drawing/2014/main" id="{33A5B379-96BF-4F27-ABA1-AC7127C5A6EF}"/>
+                <a16:creationId xmlns:a16="http://schemas.microsoft.com/office/drawing/2014/main" id="{34CD0014-4BEC-4965-96BF-FBCFC7490DB5}"/>
+              </a:ext>
+            </a:extLst>
+          </p:cNvPr>
+          <p:cNvPicPr>
+            <a:picLocks noChangeAspect="1" noChangeArrowheads="1"/>
+          </p:cNvPicPr>
+          <p:nvPr/>
+        </p:nvPicPr>
+        <p:blipFill>
+          <a:blip r:embed="rId18">
+            <a:extLst>
+              <a:ext uri="{28A0092B-C50C-407E-A947-70E740481C1C}">
+                <a14:useLocalDpi xmlns:a14="http://schemas.microsoft.com/office/drawing/2010/main" val="0"/>
+              </a:ext>
+            </a:extLst>
+          </a:blip>
+          <a:srcRect/>
+          <a:stretch>
+            <a:fillRect/>
+          </a:stretch>
+        </p:blipFill>
+        <p:spPr bwMode="auto">
+          <a:xfrm>
+            <a:off x="8804143" y="5360996"/>
+            <a:ext cx="469900" cy="469900"/>
+          </a:xfrm>
+          <a:prstGeom prst="rect">
+            <a:avLst/>
+          </a:prstGeom>
+          <a:noFill/>
+          <a:ln>
+            <a:noFill/>
+          </a:ln>
+          <a:extLst>
+            <a:ext uri="{909E8E84-426E-40DD-AFC4-6F175D3DCCD1}">
+              <a14:hiddenFill xmlns:a14="http://schemas.microsoft.com/office/drawing/2010/main">
+                <a:solidFill>
+                  <a:srgbClr val="FFFFFF"/>
+                </a:solidFill>
+              </a14:hiddenFill>
+            </a:ext>
+            <a:ext uri="{91240B29-F687-4F45-9708-019B960494DF}">
+              <a14:hiddenLine xmlns:a14="http://schemas.microsoft.com/office/drawing/2010/main" w="9525">
+                <a:solidFill>
+                  <a:srgbClr val="000000"/>
+                </a:solidFill>
+                <a:miter lim="800000"/>
+                <a:headEnd/>
+                <a:tailEnd/>
+              </a14:hiddenLine>
+            </a:ext>
+          </a:extLst>
+        </p:spPr>
+      </p:pic>
+      <p:pic>
+        <p:nvPicPr>
+          <p:cNvPr id="45" name="Graphic 60">
+            <a:extLst>
+              <a:ext uri="{FF2B5EF4-FFF2-40B4-BE49-F238E27FC236}">
+                <a16:creationId xmlns:a16="http://schemas.microsoft.com/office/drawing/2014/main" id="{C34E1A41-AA2A-4655-A6CE-3916EC8EBE9E}"/>
+              </a:ext>
+            </a:extLst>
+          </p:cNvPr>
+          <p:cNvPicPr>
+            <a:picLocks noChangeAspect="1" noChangeArrowheads="1"/>
+          </p:cNvPicPr>
+          <p:nvPr/>
+        </p:nvPicPr>
+        <p:blipFill>
+          <a:blip r:embed="rId9">
+            <a:extLst>
+              <a:ext uri="{28A0092B-C50C-407E-A947-70E740481C1C}">
+                <a14:useLocalDpi xmlns:a14="http://schemas.microsoft.com/office/drawing/2010/main" val="0"/>
+              </a:ext>
+            </a:extLst>
+          </a:blip>
+          <a:srcRect/>
+          <a:stretch>
+            <a:fillRect/>
+          </a:stretch>
+        </p:blipFill>
+        <p:spPr bwMode="auto">
+          <a:xfrm>
+            <a:off x="10267165" y="3680460"/>
+            <a:ext cx="457200" cy="457200"/>
+          </a:xfrm>
+          <a:prstGeom prst="rect">
+            <a:avLst/>
+          </a:prstGeom>
+          <a:noFill/>
+          <a:ln>
+            <a:noFill/>
+          </a:ln>
+          <a:extLst>
+            <a:ext uri="{909E8E84-426E-40DD-AFC4-6F175D3DCCD1}">
+              <a14:hiddenFill xmlns:a14="http://schemas.microsoft.com/office/drawing/2010/main">
+                <a:solidFill>
+                  <a:srgbClr val="FFFFFF"/>
+                </a:solidFill>
+              </a14:hiddenFill>
+            </a:ext>
+            <a:ext uri="{91240B29-F687-4F45-9708-019B960494DF}">
+              <a14:hiddenLine xmlns:a14="http://schemas.microsoft.com/office/drawing/2010/main" w="9525">
+                <a:solidFill>
+                  <a:srgbClr val="000000"/>
+                </a:solidFill>
+                <a:miter lim="800000"/>
+                <a:headEnd/>
+                <a:tailEnd/>
+              </a14:hiddenLine>
+            </a:ext>
+          </a:extLst>
+        </p:spPr>
+      </p:pic>
+      <p:sp>
+        <p:nvSpPr>
+          <p:cNvPr id="52" name="TextBox 16">
+            <a:extLst>
+              <a:ext uri="{FF2B5EF4-FFF2-40B4-BE49-F238E27FC236}">
+                <a16:creationId xmlns:a16="http://schemas.microsoft.com/office/drawing/2014/main" id="{FE00117F-83A7-4C44-A34D-5B48C8938506}"/>
               </a:ext>
             </a:extLst>
           </p:cNvPr>
@@ -6571,7 +7011,7 @@
         </p:nvSpPr>
         <p:spPr bwMode="auto">
           <a:xfrm>
-            <a:off x="6405478" y="5484119"/>
+            <a:off x="9937981" y="4153707"/>
             <a:ext cx="1115568" cy="430887"/>
           </a:xfrm>
           <a:prstGeom prst="rect">
@@ -6711,17 +7151,178 @@
                 <a:ea typeface="Amazon Ember" panose="020B0603020204020204" pitchFamily="34" charset="0"/>
                 <a:cs typeface="Arial" panose="020B0604020202020204" pitchFamily="34" charset="0"/>
               </a:rPr>
-              <a:t>F5 example application</a:t>
+              <a:t>F5 BIG-IP instance</a:t>
+            </a:r>
+          </a:p>
+        </p:txBody>
+      </p:sp>
+      <p:sp>
+        <p:nvSpPr>
+          <p:cNvPr id="77" name="TextBox 18">
+            <a:extLst>
+              <a:ext uri="{FF2B5EF4-FFF2-40B4-BE49-F238E27FC236}">
+                <a16:creationId xmlns:a16="http://schemas.microsoft.com/office/drawing/2014/main" id="{8D4194EA-C85A-4629-994D-E7DC2992F260}"/>
+              </a:ext>
+            </a:extLst>
+          </p:cNvPr>
+          <p:cNvSpPr txBox="1">
+            <a:spLocks noChangeArrowheads="1"/>
+          </p:cNvSpPr>
+          <p:nvPr/>
+        </p:nvSpPr>
+        <p:spPr bwMode="auto">
+          <a:xfrm>
+            <a:off x="5019020" y="5810886"/>
+            <a:ext cx="1342852" cy="430887"/>
+          </a:xfrm>
+          <a:prstGeom prst="rect">
+            <a:avLst/>
+          </a:prstGeom>
+          <a:noFill/>
+          <a:ln>
+            <a:noFill/>
+          </a:ln>
+          <a:extLst>
+            <a:ext uri="{909E8E84-426E-40DD-AFC4-6F175D3DCCD1}">
+              <a14:hiddenFill xmlns:a14="http://schemas.microsoft.com/office/drawing/2010/main">
+                <a:solidFill>
+                  <a:srgbClr val="FFFFFF"/>
+                </a:solidFill>
+              </a14:hiddenFill>
+            </a:ext>
+            <a:ext uri="{91240B29-F687-4F45-9708-019B960494DF}">
+              <a14:hiddenLine xmlns:a14="http://schemas.microsoft.com/office/drawing/2010/main" w="9525">
+                <a:solidFill>
+                  <a:srgbClr val="000000"/>
+                </a:solidFill>
+                <a:miter lim="800000"/>
+                <a:headEnd/>
+                <a:tailEnd/>
+              </a14:hiddenLine>
+            </a:ext>
+          </a:extLst>
+        </p:spPr>
+        <p:txBody>
+          <a:bodyPr wrap="square">
+            <a:spAutoFit/>
+          </a:bodyPr>
+          <a:lstStyle>
+            <a:lvl1pPr>
+              <a:defRPr>
+                <a:solidFill>
+                  <a:schemeClr val="tx1"/>
+                </a:solidFill>
+                <a:latin typeface="Calibri" panose="020F0502020204030204" pitchFamily="34" charset="0"/>
+              </a:defRPr>
+            </a:lvl1pPr>
+            <a:lvl2pPr marL="742950" indent="-285750">
+              <a:defRPr>
+                <a:solidFill>
+                  <a:schemeClr val="tx1"/>
+                </a:solidFill>
+                <a:latin typeface="Calibri" panose="020F0502020204030204" pitchFamily="34" charset="0"/>
+              </a:defRPr>
+            </a:lvl2pPr>
+            <a:lvl3pPr marL="1143000" indent="-228600">
+              <a:defRPr>
+                <a:solidFill>
+                  <a:schemeClr val="tx1"/>
+                </a:solidFill>
+                <a:latin typeface="Calibri" panose="020F0502020204030204" pitchFamily="34" charset="0"/>
+              </a:defRPr>
+            </a:lvl3pPr>
+            <a:lvl4pPr marL="1600200" indent="-228600">
+              <a:defRPr>
+                <a:solidFill>
+                  <a:schemeClr val="tx1"/>
+                </a:solidFill>
+                <a:latin typeface="Calibri" panose="020F0502020204030204" pitchFamily="34" charset="0"/>
+              </a:defRPr>
+            </a:lvl4pPr>
+            <a:lvl5pPr marL="2057400" indent="-228600">
+              <a:defRPr>
+                <a:solidFill>
+                  <a:schemeClr val="tx1"/>
+                </a:solidFill>
+                <a:latin typeface="Calibri" panose="020F0502020204030204" pitchFamily="34" charset="0"/>
+              </a:defRPr>
+            </a:lvl5pPr>
+            <a:lvl6pPr marL="2514600" indent="-228600" eaLnBrk="0" fontAlgn="base" hangingPunct="0">
+              <a:spcBef>
+                <a:spcPct val="0"/>
+              </a:spcBef>
+              <a:spcAft>
+                <a:spcPct val="0"/>
+              </a:spcAft>
+              <a:defRPr>
+                <a:solidFill>
+                  <a:schemeClr val="tx1"/>
+                </a:solidFill>
+                <a:latin typeface="Calibri" panose="020F0502020204030204" pitchFamily="34" charset="0"/>
+              </a:defRPr>
+            </a:lvl6pPr>
+            <a:lvl7pPr marL="2971800" indent="-228600" eaLnBrk="0" fontAlgn="base" hangingPunct="0">
+              <a:spcBef>
+                <a:spcPct val="0"/>
+              </a:spcBef>
+              <a:spcAft>
+                <a:spcPct val="0"/>
+              </a:spcAft>
+              <a:defRPr>
+                <a:solidFill>
+                  <a:schemeClr val="tx1"/>
+                </a:solidFill>
+                <a:latin typeface="Calibri" panose="020F0502020204030204" pitchFamily="34" charset="0"/>
+              </a:defRPr>
+            </a:lvl7pPr>
+            <a:lvl8pPr marL="3429000" indent="-228600" eaLnBrk="0" fontAlgn="base" hangingPunct="0">
+              <a:spcBef>
+                <a:spcPct val="0"/>
+              </a:spcBef>
+              <a:spcAft>
+                <a:spcPct val="0"/>
+              </a:spcAft>
+              <a:defRPr>
+                <a:solidFill>
+                  <a:schemeClr val="tx1"/>
+                </a:solidFill>
+                <a:latin typeface="Calibri" panose="020F0502020204030204" pitchFamily="34" charset="0"/>
+              </a:defRPr>
+            </a:lvl8pPr>
+            <a:lvl9pPr marL="3886200" indent="-228600" eaLnBrk="0" fontAlgn="base" hangingPunct="0">
+              <a:spcBef>
+                <a:spcPct val="0"/>
+              </a:spcBef>
+              <a:spcAft>
+                <a:spcPct val="0"/>
+              </a:spcAft>
+              <a:defRPr>
+                <a:solidFill>
+                  <a:schemeClr val="tx1"/>
+                </a:solidFill>
+                <a:latin typeface="Calibri" panose="020F0502020204030204" pitchFamily="34" charset="0"/>
+              </a:defRPr>
+            </a:lvl9pPr>
+          </a:lstStyle>
+          <a:p>
+            <a:pPr algn="ctr" eaLnBrk="1" hangingPunct="1"/>
+            <a:r>
+              <a:rPr lang="en-US" altLang="en-US" sz="1100" dirty="0">
+                <a:latin typeface="Arial" panose="020B0604020202020204" pitchFamily="34" charset="0"/>
+                <a:ea typeface="Amazon Ember" panose="020B0603020204020204" pitchFamily="34" charset="0"/>
+                <a:cs typeface="Arial" panose="020B0604020202020204" pitchFamily="34" charset="0"/>
+              </a:rPr>
+              <a:t>Elastic network interface</a:t>
             </a:r>
           </a:p>
         </p:txBody>
       </p:sp>
       <p:pic>
         <p:nvPicPr>
-          <p:cNvPr id="1028" name="Picture 4" descr="C:\Users\annaone\AppData\Local\Temp\SNAGHTML2f53f405.PNG">
+          <p:cNvPr id="78" name="Graphic 37">
             <a:extLst>
               <a:ext uri="{FF2B5EF4-FFF2-40B4-BE49-F238E27FC236}">
-                <a16:creationId xmlns:a16="http://schemas.microsoft.com/office/drawing/2014/main" id="{3C2BAB01-EDA4-448E-AE45-91879345C935}"/>
+                <a16:creationId xmlns:a16="http://schemas.microsoft.com/office/drawing/2014/main" id="{707BE448-BEF7-4F08-8610-EF332E2B4F2A}"/>
               </a:ext>
             </a:extLst>
           </p:cNvPr>
@@ -6745,42 +7346,8 @@
         </p:blipFill>
         <p:spPr bwMode="auto">
           <a:xfrm>
-            <a:off x="6456521" y="3688479"/>
-            <a:ext cx="1077277" cy="307793"/>
-          </a:xfrm>
-          <a:prstGeom prst="rect">
-            <a:avLst/>
-          </a:prstGeom>
-          <a:noFill/>
-          <a:extLst>
-            <a:ext uri="{909E8E84-426E-40DD-AFC4-6F175D3DCCD1}">
-              <a14:hiddenFill xmlns:a14="http://schemas.microsoft.com/office/drawing/2010/main">
-                <a:solidFill>
-                  <a:srgbClr val="FFFFFF"/>
-                </a:solidFill>
-              </a14:hiddenFill>
-            </a:ext>
-          </a:extLst>
-        </p:spPr>
-      </p:pic>
-      <p:sp>
-        <p:nvSpPr>
-          <p:cNvPr id="36" name="TextBox 17">
-            <a:extLst>
-              <a:ext uri="{FF2B5EF4-FFF2-40B4-BE49-F238E27FC236}">
-                <a16:creationId xmlns:a16="http://schemas.microsoft.com/office/drawing/2014/main" id="{D8402B95-D5A4-425A-B092-048DB28F8713}"/>
-              </a:ext>
-            </a:extLst>
-          </p:cNvPr>
-          <p:cNvSpPr txBox="1">
-            <a:spLocks noChangeArrowheads="1"/>
-          </p:cNvSpPr>
-          <p:nvPr/>
-        </p:nvSpPr>
-        <p:spPr bwMode="auto">
-          <a:xfrm>
-            <a:off x="6456521" y="3963262"/>
-            <a:ext cx="1107610" cy="261610"/>
+            <a:off x="5459884" y="5334704"/>
+            <a:ext cx="457200" cy="457200"/>
           </a:xfrm>
           <a:prstGeom prst="rect">
             <a:avLst/>
@@ -6809,6 +7376,53 @@
             </a:ext>
           </a:extLst>
         </p:spPr>
+      </p:pic>
+      <p:sp>
+        <p:nvSpPr>
+          <p:cNvPr id="79" name="TextBox 18">
+            <a:extLst>
+              <a:ext uri="{FF2B5EF4-FFF2-40B4-BE49-F238E27FC236}">
+                <a16:creationId xmlns:a16="http://schemas.microsoft.com/office/drawing/2014/main" id="{06AC686F-8351-4CEF-AA6D-66CE2D06C3B4}"/>
+              </a:ext>
+            </a:extLst>
+          </p:cNvPr>
+          <p:cNvSpPr txBox="1">
+            <a:spLocks noChangeArrowheads="1"/>
+          </p:cNvSpPr>
+          <p:nvPr/>
+        </p:nvSpPr>
+        <p:spPr bwMode="auto">
+          <a:xfrm>
+            <a:off x="9854628" y="5814675"/>
+            <a:ext cx="1342852" cy="430887"/>
+          </a:xfrm>
+          <a:prstGeom prst="rect">
+            <a:avLst/>
+          </a:prstGeom>
+          <a:noFill/>
+          <a:ln>
+            <a:noFill/>
+          </a:ln>
+          <a:extLst>
+            <a:ext uri="{909E8E84-426E-40DD-AFC4-6F175D3DCCD1}">
+              <a14:hiddenFill xmlns:a14="http://schemas.microsoft.com/office/drawing/2010/main">
+                <a:solidFill>
+                  <a:srgbClr val="FFFFFF"/>
+                </a:solidFill>
+              </a14:hiddenFill>
+            </a:ext>
+            <a:ext uri="{91240B29-F687-4F45-9708-019B960494DF}">
+              <a14:hiddenLine xmlns:a14="http://schemas.microsoft.com/office/drawing/2010/main" w="9525">
+                <a:solidFill>
+                  <a:srgbClr val="000000"/>
+                </a:solidFill>
+                <a:miter lim="800000"/>
+                <a:headEnd/>
+                <a:tailEnd/>
+              </a14:hiddenLine>
+            </a:ext>
+          </a:extLst>
+        </p:spPr>
         <p:txBody>
           <a:bodyPr wrap="square">
             <a:spAutoFit/>
@@ -6919,11 +7533,161 @@
                 <a:ea typeface="Amazon Ember" panose="020B0603020204020204" pitchFamily="34" charset="0"/>
                 <a:cs typeface="Arial" panose="020B0604020202020204" pitchFamily="34" charset="0"/>
               </a:rPr>
-              <a:t>NIC</a:t>
+              <a:t>Elastic network interface</a:t>
             </a:r>
           </a:p>
         </p:txBody>
       </p:sp>
+      <p:pic>
+        <p:nvPicPr>
+          <p:cNvPr id="80" name="Graphic 37">
+            <a:extLst>
+              <a:ext uri="{FF2B5EF4-FFF2-40B4-BE49-F238E27FC236}">
+                <a16:creationId xmlns:a16="http://schemas.microsoft.com/office/drawing/2014/main" id="{125B2DB8-14A6-4AB2-8150-5E97945A4F93}"/>
+              </a:ext>
+            </a:extLst>
+          </p:cNvPr>
+          <p:cNvPicPr>
+            <a:picLocks noChangeAspect="1" noChangeArrowheads="1"/>
+          </p:cNvPicPr>
+          <p:nvPr/>
+        </p:nvPicPr>
+        <p:blipFill>
+          <a:blip r:embed="rId19">
+            <a:extLst>
+              <a:ext uri="{28A0092B-C50C-407E-A947-70E740481C1C}">
+                <a14:useLocalDpi xmlns:a14="http://schemas.microsoft.com/office/drawing/2010/main" val="0"/>
+              </a:ext>
+            </a:extLst>
+          </a:blip>
+          <a:srcRect/>
+          <a:stretch>
+            <a:fillRect/>
+          </a:stretch>
+        </p:blipFill>
+        <p:spPr bwMode="auto">
+          <a:xfrm>
+            <a:off x="10267165" y="5334704"/>
+            <a:ext cx="457200" cy="457200"/>
+          </a:xfrm>
+          <a:prstGeom prst="rect">
+            <a:avLst/>
+          </a:prstGeom>
+          <a:noFill/>
+          <a:ln>
+            <a:noFill/>
+          </a:ln>
+          <a:extLst>
+            <a:ext uri="{909E8E84-426E-40DD-AFC4-6F175D3DCCD1}">
+              <a14:hiddenFill xmlns:a14="http://schemas.microsoft.com/office/drawing/2010/main">
+                <a:solidFill>
+                  <a:srgbClr val="FFFFFF"/>
+                </a:solidFill>
+              </a14:hiddenFill>
+            </a:ext>
+            <a:ext uri="{91240B29-F687-4F45-9708-019B960494DF}">
+              <a14:hiddenLine xmlns:a14="http://schemas.microsoft.com/office/drawing/2010/main" w="9525">
+                <a:solidFill>
+                  <a:srgbClr val="000000"/>
+                </a:solidFill>
+                <a:miter lim="800000"/>
+                <a:headEnd/>
+                <a:tailEnd/>
+              </a14:hiddenLine>
+            </a:ext>
+          </a:extLst>
+        </p:spPr>
+      </p:pic>
+      <p:cxnSp>
+        <p:nvCxnSpPr>
+          <p:cNvPr id="84" name="Straight Arrow Connector 83">
+            <a:extLst>
+              <a:ext uri="{FF2B5EF4-FFF2-40B4-BE49-F238E27FC236}">
+                <a16:creationId xmlns:a16="http://schemas.microsoft.com/office/drawing/2014/main" id="{FB35EED3-368B-47F7-9B1C-0121C77DBDB4}"/>
+              </a:ext>
+            </a:extLst>
+          </p:cNvPr>
+          <p:cNvCxnSpPr>
+            <a:cxnSpLocks/>
+          </p:cNvCxnSpPr>
+          <p:nvPr/>
+        </p:nvCxnSpPr>
+        <p:spPr>
+          <a:xfrm rot="-5400000">
+            <a:off x="5322724" y="4945555"/>
+            <a:ext cx="731520" cy="0"/>
+          </a:xfrm>
+          <a:prstGeom prst="straightConnector1">
+            <a:avLst/>
+          </a:prstGeom>
+          <a:ln w="12700">
+            <a:solidFill>
+              <a:schemeClr val="tx2"/>
+            </a:solidFill>
+            <a:headEnd type="arrow" w="med" len="sm"/>
+            <a:tailEnd type="none" w="med" len="sm"/>
+          </a:ln>
+        </p:spPr>
+        <p:style>
+          <a:lnRef idx="1">
+            <a:schemeClr val="accent1"/>
+          </a:lnRef>
+          <a:fillRef idx="0">
+            <a:schemeClr val="accent1"/>
+          </a:fillRef>
+          <a:effectRef idx="0">
+            <a:schemeClr val="accent1"/>
+          </a:effectRef>
+          <a:fontRef idx="minor">
+            <a:schemeClr val="tx1"/>
+          </a:fontRef>
+        </p:style>
+      </p:cxnSp>
+      <p:cxnSp>
+        <p:nvCxnSpPr>
+          <p:cNvPr id="68" name="Straight Arrow Connector 67">
+            <a:extLst>
+              <a:ext uri="{FF2B5EF4-FFF2-40B4-BE49-F238E27FC236}">
+                <a16:creationId xmlns:a16="http://schemas.microsoft.com/office/drawing/2014/main" id="{835AE074-69FA-43AF-8616-FA316F745682}"/>
+              </a:ext>
+            </a:extLst>
+          </p:cNvPr>
+          <p:cNvCxnSpPr>
+            <a:cxnSpLocks/>
+          </p:cNvCxnSpPr>
+          <p:nvPr/>
+        </p:nvCxnSpPr>
+        <p:spPr>
+          <a:xfrm rot="-5400000">
+            <a:off x="10130005" y="4952553"/>
+            <a:ext cx="731520" cy="0"/>
+          </a:xfrm>
+          <a:prstGeom prst="straightConnector1">
+            <a:avLst/>
+          </a:prstGeom>
+          <a:ln w="12700">
+            <a:solidFill>
+              <a:schemeClr val="tx2"/>
+            </a:solidFill>
+            <a:headEnd type="arrow" w="med" len="sm"/>
+            <a:tailEnd type="none" w="med" len="sm"/>
+          </a:ln>
+        </p:spPr>
+        <p:style>
+          <a:lnRef idx="1">
+            <a:schemeClr val="accent1"/>
+          </a:lnRef>
+          <a:fillRef idx="0">
+            <a:schemeClr val="accent1"/>
+          </a:fillRef>
+          <a:effectRef idx="0">
+            <a:schemeClr val="accent1"/>
+          </a:effectRef>
+          <a:fontRef idx="minor">
+            <a:schemeClr val="tx1"/>
+          </a:fontRef>
+        </p:style>
+      </p:cxnSp>
     </p:spTree>
     <p:extLst>
       <p:ext uri="{BB962C8B-B14F-4D97-AF65-F5344CB8AC3E}">

</xml_diff>

<commit_message>
Supplemented SSH Key key instructions Updated Architectural Diagram to be accurate Some asciiDoc format fixes
</commit_message>
<xml_diff>
--- a/docs/deployment_guide/images/f5-big-ip-virtual-edition-architecture-diagram.pptx
+++ b/docs/deployment_guide/images/f5-big-ip-virtual-edition-architecture-diagram.pptx
@@ -224,7 +224,7 @@
           <a:p>
             <a:fld id="{49A7721D-1176-A640-AC48-B82F78C92D56}" type="datetimeFigureOut">
               <a:rPr lang="en-US" smtClean="0"/>
-              <a:t>6/8/2022</a:t>
+              <a:t>11/17/22</a:t>
             </a:fld>
             <a:endParaRPr lang="en-US" dirty="0"/>
           </a:p>
@@ -401,7 +401,7 @@
           <a:p>
             <a:fld id="{C884A089-FB25-6D46-9D21-F0F04A18BCA8}" type="datetimeFigureOut">
               <a:rPr lang="en-US" smtClean="0"/>
-              <a:t>6/8/2022</a:t>
+              <a:t>11/17/22</a:t>
             </a:fld>
             <a:endParaRPr lang="en-US" dirty="0"/>
           </a:p>
@@ -1033,7 +1033,7 @@
           <a:p>
             <a:fld id="{C764DE79-268F-4C1A-8933-263129D2AF90}" type="datetimeFigureOut">
               <a:rPr lang="en-US" dirty="0"/>
-              <a:t>6/8/2022</a:t>
+              <a:t>11/17/22</a:t>
             </a:fld>
             <a:endParaRPr lang="en-US" dirty="0"/>
           </a:p>
@@ -1204,7 +1204,7 @@
           <a:p>
             <a:fld id="{C764DE79-268F-4C1A-8933-263129D2AF90}" type="datetimeFigureOut">
               <a:rPr lang="en-US" dirty="0"/>
-              <a:t>6/8/2022</a:t>
+              <a:t>11/17/22</a:t>
             </a:fld>
             <a:endParaRPr lang="en-US" dirty="0"/>
           </a:p>
@@ -1385,7 +1385,7 @@
           <a:p>
             <a:fld id="{C764DE79-268F-4C1A-8933-263129D2AF90}" type="datetimeFigureOut">
               <a:rPr lang="en-US" dirty="0"/>
-              <a:t>6/8/2022</a:t>
+              <a:t>11/17/22</a:t>
             </a:fld>
             <a:endParaRPr lang="en-US" dirty="0"/>
           </a:p>
@@ -1578,7 +1578,7 @@
           <a:p>
             <a:fld id="{C764DE79-268F-4C1A-8933-263129D2AF90}" type="datetimeFigureOut">
               <a:rPr lang="en-US" dirty="0"/>
-              <a:t>6/8/2022</a:t>
+              <a:t>11/17/22</a:t>
             </a:fld>
             <a:endParaRPr lang="en-US" dirty="0"/>
           </a:p>
@@ -1749,7 +1749,7 @@
           <a:p>
             <a:fld id="{C764DE79-268F-4C1A-8933-263129D2AF90}" type="datetimeFigureOut">
               <a:rPr lang="en-US" dirty="0"/>
-              <a:t>6/8/2022</a:t>
+              <a:t>11/17/22</a:t>
             </a:fld>
             <a:endParaRPr lang="en-US" dirty="0"/>
           </a:p>
@@ -1994,7 +1994,7 @@
           <a:p>
             <a:fld id="{C764DE79-268F-4C1A-8933-263129D2AF90}" type="datetimeFigureOut">
               <a:rPr lang="en-US" dirty="0"/>
-              <a:t>6/8/2022</a:t>
+              <a:t>11/17/22</a:t>
             </a:fld>
             <a:endParaRPr lang="en-US" dirty="0"/>
           </a:p>
@@ -2227,7 +2227,7 @@
           <a:p>
             <a:fld id="{C764DE79-268F-4C1A-8933-263129D2AF90}" type="datetimeFigureOut">
               <a:rPr lang="en-US" dirty="0"/>
-              <a:t>6/8/2022</a:t>
+              <a:t>11/17/22</a:t>
             </a:fld>
             <a:endParaRPr lang="en-US" dirty="0"/>
           </a:p>
@@ -2595,7 +2595,7 @@
           <a:p>
             <a:fld id="{C764DE79-268F-4C1A-8933-263129D2AF90}" type="datetimeFigureOut">
               <a:rPr lang="en-US" dirty="0"/>
-              <a:t>6/8/2022</a:t>
+              <a:t>11/17/22</a:t>
             </a:fld>
             <a:endParaRPr lang="en-US" dirty="0"/>
           </a:p>
@@ -2714,7 +2714,7 @@
           <a:p>
             <a:fld id="{C764DE79-268F-4C1A-8933-263129D2AF90}" type="datetimeFigureOut">
               <a:rPr lang="en-US" dirty="0"/>
-              <a:t>6/8/2022</a:t>
+              <a:t>11/17/22</a:t>
             </a:fld>
             <a:endParaRPr lang="en-US" dirty="0"/>
           </a:p>
@@ -3083,7 +3083,7 @@
           <a:p>
             <a:fld id="{C764DE79-268F-4C1A-8933-263129D2AF90}" type="datetimeFigureOut">
               <a:rPr lang="en-US" dirty="0"/>
-              <a:t>6/8/2022</a:t>
+              <a:t>11/17/22</a:t>
             </a:fld>
             <a:endParaRPr lang="en-US" dirty="0"/>
           </a:p>
@@ -3617,7 +3617,7 @@
           <a:p>
             <a:fld id="{C764DE79-268F-4C1A-8933-263129D2AF90}" type="datetimeFigureOut">
               <a:rPr lang="en-US" dirty="0"/>
-              <a:t>6/8/2022</a:t>
+              <a:t>11/17/22</a:t>
             </a:fld>
             <a:endParaRPr lang="en-US" dirty="0"/>
           </a:p>
@@ -4038,7 +4038,7 @@
         <p:spPr>
           <a:xfrm>
             <a:off x="2011680" y="1463039"/>
-            <a:ext cx="10875645" cy="5318761"/>
+            <a:ext cx="11196320" cy="6835141"/>
           </a:xfrm>
           <a:prstGeom prst="rect">
             <a:avLst/>
@@ -4107,7 +4107,7 @@
         <p:spPr>
           <a:xfrm>
             <a:off x="2560319" y="2011679"/>
-            <a:ext cx="10157045" cy="4503421"/>
+            <a:ext cx="10157045" cy="6098258"/>
           </a:xfrm>
           <a:prstGeom prst="rect">
             <a:avLst/>
@@ -4176,8 +4176,8 @@
         </p:nvSpPr>
         <p:spPr>
           <a:xfrm>
-            <a:off x="3749040" y="4842599"/>
-            <a:ext cx="2674832" cy="1541145"/>
+            <a:off x="3736486" y="4844287"/>
+            <a:ext cx="2674832" cy="845121"/>
           </a:xfrm>
           <a:prstGeom prst="rect">
             <a:avLst/>
@@ -4223,7 +4223,7 @@
                 <a:latin typeface="Arial" panose="020B0604020202020204" pitchFamily="34" charset="0"/>
                 <a:cs typeface="Arial" panose="020B0604020202020204" pitchFamily="34" charset="0"/>
               </a:rPr>
-              <a:t>Private subnet</a:t>
+              <a:t>Private subnet 1</a:t>
             </a:r>
           </a:p>
         </p:txBody>
@@ -4602,7 +4602,7 @@
         <p:spPr>
           <a:xfrm>
             <a:off x="3474720" y="1645920"/>
-            <a:ext cx="3170104" cy="4996180"/>
+            <a:ext cx="3170104" cy="6098258"/>
           </a:xfrm>
           <a:prstGeom prst="rect">
             <a:avLst/>
@@ -5121,7 +5121,7 @@
         <p:spPr>
           <a:xfrm>
             <a:off x="8419322" y="4864904"/>
-            <a:ext cx="2679192" cy="1545336"/>
+            <a:ext cx="2679192" cy="847137"/>
           </a:xfrm>
           <a:prstGeom prst="rect">
             <a:avLst/>
@@ -5167,7 +5167,7 @@
                 <a:latin typeface="Arial" panose="020B0604020202020204" pitchFamily="34" charset="0"/>
                 <a:cs typeface="Arial" panose="020B0604020202020204" pitchFamily="34" charset="0"/>
               </a:rPr>
-              <a:t>Private subnet</a:t>
+              <a:t>Private subnet 1</a:t>
             </a:r>
           </a:p>
         </p:txBody>
@@ -5546,7 +5546,7 @@
         <p:spPr>
           <a:xfrm>
             <a:off x="8174595" y="1645920"/>
-            <a:ext cx="3185761" cy="4996180"/>
+            <a:ext cx="3185761" cy="6098258"/>
           </a:xfrm>
           <a:prstGeom prst="rect">
             <a:avLst/>
@@ -5978,287 +5978,6 @@
           <a:prstGeom prst="rect">
             <a:avLst/>
           </a:prstGeom>
-        </p:spPr>
-      </p:pic>
-      <p:pic>
-        <p:nvPicPr>
-          <p:cNvPr id="65" name="Graphic 60">
-            <a:extLst>
-              <a:ext uri="{FF2B5EF4-FFF2-40B4-BE49-F238E27FC236}">
-                <a16:creationId xmlns:a16="http://schemas.microsoft.com/office/drawing/2014/main" id="{9F9BDC2B-ADC1-4D56-B386-5AD0AC1EF1C2}"/>
-              </a:ext>
-            </a:extLst>
-          </p:cNvPr>
-          <p:cNvPicPr>
-            <a:picLocks noChangeAspect="1" noChangeArrowheads="1"/>
-          </p:cNvPicPr>
-          <p:nvPr/>
-        </p:nvPicPr>
-        <p:blipFill>
-          <a:blip r:embed="rId9">
-            <a:extLst>
-              <a:ext uri="{28A0092B-C50C-407E-A947-70E740481C1C}">
-                <a14:useLocalDpi xmlns:a14="http://schemas.microsoft.com/office/drawing/2010/main" val="0"/>
-              </a:ext>
-            </a:extLst>
-          </a:blip>
-          <a:srcRect/>
-          <a:stretch>
-            <a:fillRect/>
-          </a:stretch>
-        </p:blipFill>
-        <p:spPr bwMode="auto">
-          <a:xfrm>
-            <a:off x="5459884" y="3685900"/>
-            <a:ext cx="457200" cy="457200"/>
-          </a:xfrm>
-          <a:prstGeom prst="rect">
-            <a:avLst/>
-          </a:prstGeom>
-          <a:noFill/>
-          <a:ln>
-            <a:noFill/>
-          </a:ln>
-          <a:extLst>
-            <a:ext uri="{909E8E84-426E-40DD-AFC4-6F175D3DCCD1}">
-              <a14:hiddenFill xmlns:a14="http://schemas.microsoft.com/office/drawing/2010/main">
-                <a:solidFill>
-                  <a:srgbClr val="FFFFFF"/>
-                </a:solidFill>
-              </a14:hiddenFill>
-            </a:ext>
-            <a:ext uri="{91240B29-F687-4F45-9708-019B960494DF}">
-              <a14:hiddenLine xmlns:a14="http://schemas.microsoft.com/office/drawing/2010/main" w="9525">
-                <a:solidFill>
-                  <a:srgbClr val="000000"/>
-                </a:solidFill>
-                <a:miter lim="800000"/>
-                <a:headEnd/>
-                <a:tailEnd/>
-              </a14:hiddenLine>
-            </a:ext>
-          </a:extLst>
-        </p:spPr>
-      </p:pic>
-      <p:sp>
-        <p:nvSpPr>
-          <p:cNvPr id="66" name="TextBox 16">
-            <a:extLst>
-              <a:ext uri="{FF2B5EF4-FFF2-40B4-BE49-F238E27FC236}">
-                <a16:creationId xmlns:a16="http://schemas.microsoft.com/office/drawing/2014/main" id="{E4351C67-7433-4600-B7AB-32A6DDC70617}"/>
-              </a:ext>
-            </a:extLst>
-          </p:cNvPr>
-          <p:cNvSpPr txBox="1">
-            <a:spLocks noChangeArrowheads="1"/>
-          </p:cNvSpPr>
-          <p:nvPr/>
-        </p:nvSpPr>
-        <p:spPr bwMode="auto">
-          <a:xfrm>
-            <a:off x="5108020" y="4155906"/>
-            <a:ext cx="1115568" cy="430887"/>
-          </a:xfrm>
-          <a:prstGeom prst="rect">
-            <a:avLst/>
-          </a:prstGeom>
-          <a:noFill/>
-          <a:ln>
-            <a:noFill/>
-          </a:ln>
-          <a:extLst>
-            <a:ext uri="{909E8E84-426E-40DD-AFC4-6F175D3DCCD1}">
-              <a14:hiddenFill xmlns:a14="http://schemas.microsoft.com/office/drawing/2010/main">
-                <a:solidFill>
-                  <a:srgbClr val="FFFFFF"/>
-                </a:solidFill>
-              </a14:hiddenFill>
-            </a:ext>
-            <a:ext uri="{91240B29-F687-4F45-9708-019B960494DF}">
-              <a14:hiddenLine xmlns:a14="http://schemas.microsoft.com/office/drawing/2010/main" w="9525">
-                <a:solidFill>
-                  <a:srgbClr val="000000"/>
-                </a:solidFill>
-                <a:miter lim="800000"/>
-                <a:headEnd/>
-                <a:tailEnd/>
-              </a14:hiddenLine>
-            </a:ext>
-          </a:extLst>
-        </p:spPr>
-        <p:txBody>
-          <a:bodyPr wrap="square" lIns="0" rIns="0">
-            <a:spAutoFit/>
-          </a:bodyPr>
-          <a:lstStyle>
-            <a:lvl1pPr>
-              <a:defRPr>
-                <a:solidFill>
-                  <a:schemeClr val="tx1"/>
-                </a:solidFill>
-                <a:latin typeface="Calibri" panose="020F0502020204030204" pitchFamily="34" charset="0"/>
-              </a:defRPr>
-            </a:lvl1pPr>
-            <a:lvl2pPr marL="742950" indent="-285750">
-              <a:defRPr>
-                <a:solidFill>
-                  <a:schemeClr val="tx1"/>
-                </a:solidFill>
-                <a:latin typeface="Calibri" panose="020F0502020204030204" pitchFamily="34" charset="0"/>
-              </a:defRPr>
-            </a:lvl2pPr>
-            <a:lvl3pPr marL="1143000" indent="-228600">
-              <a:defRPr>
-                <a:solidFill>
-                  <a:schemeClr val="tx1"/>
-                </a:solidFill>
-                <a:latin typeface="Calibri" panose="020F0502020204030204" pitchFamily="34" charset="0"/>
-              </a:defRPr>
-            </a:lvl3pPr>
-            <a:lvl4pPr marL="1600200" indent="-228600">
-              <a:defRPr>
-                <a:solidFill>
-                  <a:schemeClr val="tx1"/>
-                </a:solidFill>
-                <a:latin typeface="Calibri" panose="020F0502020204030204" pitchFamily="34" charset="0"/>
-              </a:defRPr>
-            </a:lvl4pPr>
-            <a:lvl5pPr marL="2057400" indent="-228600">
-              <a:defRPr>
-                <a:solidFill>
-                  <a:schemeClr val="tx1"/>
-                </a:solidFill>
-                <a:latin typeface="Calibri" panose="020F0502020204030204" pitchFamily="34" charset="0"/>
-              </a:defRPr>
-            </a:lvl5pPr>
-            <a:lvl6pPr marL="2514600" indent="-228600" eaLnBrk="0" fontAlgn="base" hangingPunct="0">
-              <a:spcBef>
-                <a:spcPct val="0"/>
-              </a:spcBef>
-              <a:spcAft>
-                <a:spcPct val="0"/>
-              </a:spcAft>
-              <a:defRPr>
-                <a:solidFill>
-                  <a:schemeClr val="tx1"/>
-                </a:solidFill>
-                <a:latin typeface="Calibri" panose="020F0502020204030204" pitchFamily="34" charset="0"/>
-              </a:defRPr>
-            </a:lvl6pPr>
-            <a:lvl7pPr marL="2971800" indent="-228600" eaLnBrk="0" fontAlgn="base" hangingPunct="0">
-              <a:spcBef>
-                <a:spcPct val="0"/>
-              </a:spcBef>
-              <a:spcAft>
-                <a:spcPct val="0"/>
-              </a:spcAft>
-              <a:defRPr>
-                <a:solidFill>
-                  <a:schemeClr val="tx1"/>
-                </a:solidFill>
-                <a:latin typeface="Calibri" panose="020F0502020204030204" pitchFamily="34" charset="0"/>
-              </a:defRPr>
-            </a:lvl7pPr>
-            <a:lvl8pPr marL="3429000" indent="-228600" eaLnBrk="0" fontAlgn="base" hangingPunct="0">
-              <a:spcBef>
-                <a:spcPct val="0"/>
-              </a:spcBef>
-              <a:spcAft>
-                <a:spcPct val="0"/>
-              </a:spcAft>
-              <a:defRPr>
-                <a:solidFill>
-                  <a:schemeClr val="tx1"/>
-                </a:solidFill>
-                <a:latin typeface="Calibri" panose="020F0502020204030204" pitchFamily="34" charset="0"/>
-              </a:defRPr>
-            </a:lvl8pPr>
-            <a:lvl9pPr marL="3886200" indent="-228600" eaLnBrk="0" fontAlgn="base" hangingPunct="0">
-              <a:spcBef>
-                <a:spcPct val="0"/>
-              </a:spcBef>
-              <a:spcAft>
-                <a:spcPct val="0"/>
-              </a:spcAft>
-              <a:defRPr>
-                <a:solidFill>
-                  <a:schemeClr val="tx1"/>
-                </a:solidFill>
-                <a:latin typeface="Calibri" panose="020F0502020204030204" pitchFamily="34" charset="0"/>
-              </a:defRPr>
-            </a:lvl9pPr>
-          </a:lstStyle>
-          <a:p>
-            <a:pPr algn="ctr" eaLnBrk="1" hangingPunct="1"/>
-            <a:r>
-              <a:rPr lang="en-US" altLang="en-US" sz="1100" dirty="0">
-                <a:latin typeface="Arial" panose="020B0604020202020204" pitchFamily="34" charset="0"/>
-                <a:ea typeface="Amazon Ember" panose="020B0603020204020204" pitchFamily="34" charset="0"/>
-                <a:cs typeface="Arial" panose="020B0604020202020204" pitchFamily="34" charset="0"/>
-              </a:rPr>
-              <a:t>F5 BIG-IP instance</a:t>
-            </a:r>
-          </a:p>
-        </p:txBody>
-      </p:sp>
-      <p:pic>
-        <p:nvPicPr>
-          <p:cNvPr id="67" name="Graphic 60">
-            <a:extLst>
-              <a:ext uri="{FF2B5EF4-FFF2-40B4-BE49-F238E27FC236}">
-                <a16:creationId xmlns:a16="http://schemas.microsoft.com/office/drawing/2014/main" id="{3B1BF2D6-84B8-40EB-98A3-5A0D4EFAE9E0}"/>
-              </a:ext>
-            </a:extLst>
-          </p:cNvPr>
-          <p:cNvPicPr>
-            <a:picLocks noChangeAspect="1" noChangeArrowheads="1"/>
-          </p:cNvPicPr>
-          <p:nvPr/>
-        </p:nvPicPr>
-        <p:blipFill>
-          <a:blip r:embed="rId9">
-            <a:extLst>
-              <a:ext uri="{28A0092B-C50C-407E-A947-70E740481C1C}">
-                <a14:useLocalDpi xmlns:a14="http://schemas.microsoft.com/office/drawing/2010/main" val="0"/>
-              </a:ext>
-            </a:extLst>
-          </a:blip>
-          <a:srcRect/>
-          <a:stretch>
-            <a:fillRect/>
-          </a:stretch>
-        </p:blipFill>
-        <p:spPr bwMode="auto">
-          <a:xfrm>
-            <a:off x="15611385" y="7492365"/>
-            <a:ext cx="457200" cy="457200"/>
-          </a:xfrm>
-          <a:prstGeom prst="rect">
-            <a:avLst/>
-          </a:prstGeom>
-          <a:noFill/>
-          <a:ln>
-            <a:noFill/>
-          </a:ln>
-          <a:extLst>
-            <a:ext uri="{909E8E84-426E-40DD-AFC4-6F175D3DCCD1}">
-              <a14:hiddenFill xmlns:a14="http://schemas.microsoft.com/office/drawing/2010/main">
-                <a:solidFill>
-                  <a:srgbClr val="FFFFFF"/>
-                </a:solidFill>
-              </a14:hiddenFill>
-            </a:ext>
-            <a:ext uri="{91240B29-F687-4F45-9708-019B960494DF}">
-              <a14:hiddenLine xmlns:a14="http://schemas.microsoft.com/office/drawing/2010/main" w="9525">
-                <a:solidFill>
-                  <a:srgbClr val="000000"/>
-                </a:solidFill>
-                <a:miter lim="800000"/>
-                <a:headEnd/>
-                <a:tailEnd/>
-              </a14:hiddenLine>
-            </a:ext>
-          </a:extLst>
         </p:spPr>
       </p:pic>
       <p:pic>
@@ -6334,167 +6053,6 @@
       </p:pic>
       <p:sp>
         <p:nvSpPr>
-          <p:cNvPr id="71" name="TextBox 16">
-            <a:extLst>
-              <a:ext uri="{FF2B5EF4-FFF2-40B4-BE49-F238E27FC236}">
-                <a16:creationId xmlns:a16="http://schemas.microsoft.com/office/drawing/2014/main" id="{056DC476-D183-4392-BC29-2C93430C2228}"/>
-              </a:ext>
-            </a:extLst>
-          </p:cNvPr>
-          <p:cNvSpPr txBox="1">
-            <a:spLocks noChangeArrowheads="1"/>
-          </p:cNvSpPr>
-          <p:nvPr/>
-        </p:nvSpPr>
-        <p:spPr bwMode="auto">
-          <a:xfrm>
-            <a:off x="15291557" y="7945201"/>
-            <a:ext cx="1115568" cy="430887"/>
-          </a:xfrm>
-          <a:prstGeom prst="rect">
-            <a:avLst/>
-          </a:prstGeom>
-          <a:noFill/>
-          <a:ln>
-            <a:noFill/>
-          </a:ln>
-          <a:extLst>
-            <a:ext uri="{909E8E84-426E-40DD-AFC4-6F175D3DCCD1}">
-              <a14:hiddenFill xmlns:a14="http://schemas.microsoft.com/office/drawing/2010/main">
-                <a:solidFill>
-                  <a:srgbClr val="FFFFFF"/>
-                </a:solidFill>
-              </a14:hiddenFill>
-            </a:ext>
-            <a:ext uri="{91240B29-F687-4F45-9708-019B960494DF}">
-              <a14:hiddenLine xmlns:a14="http://schemas.microsoft.com/office/drawing/2010/main" w="9525">
-                <a:solidFill>
-                  <a:srgbClr val="000000"/>
-                </a:solidFill>
-                <a:miter lim="800000"/>
-                <a:headEnd/>
-                <a:tailEnd/>
-              </a14:hiddenLine>
-            </a:ext>
-          </a:extLst>
-        </p:spPr>
-        <p:txBody>
-          <a:bodyPr wrap="square" lIns="0" rIns="0">
-            <a:spAutoFit/>
-          </a:bodyPr>
-          <a:lstStyle>
-            <a:lvl1pPr>
-              <a:defRPr>
-                <a:solidFill>
-                  <a:schemeClr val="tx1"/>
-                </a:solidFill>
-                <a:latin typeface="Calibri" panose="020F0502020204030204" pitchFamily="34" charset="0"/>
-              </a:defRPr>
-            </a:lvl1pPr>
-            <a:lvl2pPr marL="742950" indent="-285750">
-              <a:defRPr>
-                <a:solidFill>
-                  <a:schemeClr val="tx1"/>
-                </a:solidFill>
-                <a:latin typeface="Calibri" panose="020F0502020204030204" pitchFamily="34" charset="0"/>
-              </a:defRPr>
-            </a:lvl2pPr>
-            <a:lvl3pPr marL="1143000" indent="-228600">
-              <a:defRPr>
-                <a:solidFill>
-                  <a:schemeClr val="tx1"/>
-                </a:solidFill>
-                <a:latin typeface="Calibri" panose="020F0502020204030204" pitchFamily="34" charset="0"/>
-              </a:defRPr>
-            </a:lvl3pPr>
-            <a:lvl4pPr marL="1600200" indent="-228600">
-              <a:defRPr>
-                <a:solidFill>
-                  <a:schemeClr val="tx1"/>
-                </a:solidFill>
-                <a:latin typeface="Calibri" panose="020F0502020204030204" pitchFamily="34" charset="0"/>
-              </a:defRPr>
-            </a:lvl4pPr>
-            <a:lvl5pPr marL="2057400" indent="-228600">
-              <a:defRPr>
-                <a:solidFill>
-                  <a:schemeClr val="tx1"/>
-                </a:solidFill>
-                <a:latin typeface="Calibri" panose="020F0502020204030204" pitchFamily="34" charset="0"/>
-              </a:defRPr>
-            </a:lvl5pPr>
-            <a:lvl6pPr marL="2514600" indent="-228600" eaLnBrk="0" fontAlgn="base" hangingPunct="0">
-              <a:spcBef>
-                <a:spcPct val="0"/>
-              </a:spcBef>
-              <a:spcAft>
-                <a:spcPct val="0"/>
-              </a:spcAft>
-              <a:defRPr>
-                <a:solidFill>
-                  <a:schemeClr val="tx1"/>
-                </a:solidFill>
-                <a:latin typeface="Calibri" panose="020F0502020204030204" pitchFamily="34" charset="0"/>
-              </a:defRPr>
-            </a:lvl6pPr>
-            <a:lvl7pPr marL="2971800" indent="-228600" eaLnBrk="0" fontAlgn="base" hangingPunct="0">
-              <a:spcBef>
-                <a:spcPct val="0"/>
-              </a:spcBef>
-              <a:spcAft>
-                <a:spcPct val="0"/>
-              </a:spcAft>
-              <a:defRPr>
-                <a:solidFill>
-                  <a:schemeClr val="tx1"/>
-                </a:solidFill>
-                <a:latin typeface="Calibri" panose="020F0502020204030204" pitchFamily="34" charset="0"/>
-              </a:defRPr>
-            </a:lvl7pPr>
-            <a:lvl8pPr marL="3429000" indent="-228600" eaLnBrk="0" fontAlgn="base" hangingPunct="0">
-              <a:spcBef>
-                <a:spcPct val="0"/>
-              </a:spcBef>
-              <a:spcAft>
-                <a:spcPct val="0"/>
-              </a:spcAft>
-              <a:defRPr>
-                <a:solidFill>
-                  <a:schemeClr val="tx1"/>
-                </a:solidFill>
-                <a:latin typeface="Calibri" panose="020F0502020204030204" pitchFamily="34" charset="0"/>
-              </a:defRPr>
-            </a:lvl8pPr>
-            <a:lvl9pPr marL="3886200" indent="-228600" eaLnBrk="0" fontAlgn="base" hangingPunct="0">
-              <a:spcBef>
-                <a:spcPct val="0"/>
-              </a:spcBef>
-              <a:spcAft>
-                <a:spcPct val="0"/>
-              </a:spcAft>
-              <a:defRPr>
-                <a:solidFill>
-                  <a:schemeClr val="tx1"/>
-                </a:solidFill>
-                <a:latin typeface="Calibri" panose="020F0502020204030204" pitchFamily="34" charset="0"/>
-              </a:defRPr>
-            </a:lvl9pPr>
-          </a:lstStyle>
-          <a:p>
-            <a:pPr algn="ctr" eaLnBrk="1" hangingPunct="1"/>
-            <a:r>
-              <a:rPr lang="en-US" altLang="en-US" sz="1100" dirty="0">
-                <a:latin typeface="Arial" panose="020B0604020202020204" pitchFamily="34" charset="0"/>
-                <a:ea typeface="Amazon Ember" panose="020B0603020204020204" pitchFamily="34" charset="0"/>
-                <a:cs typeface="Arial" panose="020B0604020202020204" pitchFamily="34" charset="0"/>
-              </a:rPr>
-              <a:t>F5 BIG-IP instance</a:t>
-            </a:r>
-          </a:p>
-        </p:txBody>
-      </p:sp>
-      <p:sp>
-        <p:nvSpPr>
           <p:cNvPr id="33" name="TextBox 16">
             <a:extLst>
               <a:ext uri="{FF2B5EF4-FFF2-40B4-BE49-F238E27FC236}">
@@ -6509,168 +6067,7 @@
         </p:nvSpPr>
         <p:spPr bwMode="auto">
           <a:xfrm>
-            <a:off x="3741836" y="5791904"/>
-            <a:ext cx="1115568" cy="430887"/>
-          </a:xfrm>
-          <a:prstGeom prst="rect">
-            <a:avLst/>
-          </a:prstGeom>
-          <a:noFill/>
-          <a:ln>
-            <a:noFill/>
-          </a:ln>
-          <a:extLst>
-            <a:ext uri="{909E8E84-426E-40DD-AFC4-6F175D3DCCD1}">
-              <a14:hiddenFill xmlns:a14="http://schemas.microsoft.com/office/drawing/2010/main">
-                <a:solidFill>
-                  <a:srgbClr val="FFFFFF"/>
-                </a:solidFill>
-              </a14:hiddenFill>
-            </a:ext>
-            <a:ext uri="{91240B29-F687-4F45-9708-019B960494DF}">
-              <a14:hiddenLine xmlns:a14="http://schemas.microsoft.com/office/drawing/2010/main" w="9525">
-                <a:solidFill>
-                  <a:srgbClr val="000000"/>
-                </a:solidFill>
-                <a:miter lim="800000"/>
-                <a:headEnd/>
-                <a:tailEnd/>
-              </a14:hiddenLine>
-            </a:ext>
-          </a:extLst>
-        </p:spPr>
-        <p:txBody>
-          <a:bodyPr wrap="square" lIns="0" rIns="0">
-            <a:spAutoFit/>
-          </a:bodyPr>
-          <a:lstStyle>
-            <a:lvl1pPr>
-              <a:defRPr>
-                <a:solidFill>
-                  <a:schemeClr val="tx1"/>
-                </a:solidFill>
-                <a:latin typeface="Calibri" panose="020F0502020204030204" pitchFamily="34" charset="0"/>
-              </a:defRPr>
-            </a:lvl1pPr>
-            <a:lvl2pPr marL="742950" indent="-285750">
-              <a:defRPr>
-                <a:solidFill>
-                  <a:schemeClr val="tx1"/>
-                </a:solidFill>
-                <a:latin typeface="Calibri" panose="020F0502020204030204" pitchFamily="34" charset="0"/>
-              </a:defRPr>
-            </a:lvl2pPr>
-            <a:lvl3pPr marL="1143000" indent="-228600">
-              <a:defRPr>
-                <a:solidFill>
-                  <a:schemeClr val="tx1"/>
-                </a:solidFill>
-                <a:latin typeface="Calibri" panose="020F0502020204030204" pitchFamily="34" charset="0"/>
-              </a:defRPr>
-            </a:lvl3pPr>
-            <a:lvl4pPr marL="1600200" indent="-228600">
-              <a:defRPr>
-                <a:solidFill>
-                  <a:schemeClr val="tx1"/>
-                </a:solidFill>
-                <a:latin typeface="Calibri" panose="020F0502020204030204" pitchFamily="34" charset="0"/>
-              </a:defRPr>
-            </a:lvl4pPr>
-            <a:lvl5pPr marL="2057400" indent="-228600">
-              <a:defRPr>
-                <a:solidFill>
-                  <a:schemeClr val="tx1"/>
-                </a:solidFill>
-                <a:latin typeface="Calibri" panose="020F0502020204030204" pitchFamily="34" charset="0"/>
-              </a:defRPr>
-            </a:lvl5pPr>
-            <a:lvl6pPr marL="2514600" indent="-228600" eaLnBrk="0" fontAlgn="base" hangingPunct="0">
-              <a:spcBef>
-                <a:spcPct val="0"/>
-              </a:spcBef>
-              <a:spcAft>
-                <a:spcPct val="0"/>
-              </a:spcAft>
-              <a:defRPr>
-                <a:solidFill>
-                  <a:schemeClr val="tx1"/>
-                </a:solidFill>
-                <a:latin typeface="Calibri" panose="020F0502020204030204" pitchFamily="34" charset="0"/>
-              </a:defRPr>
-            </a:lvl6pPr>
-            <a:lvl7pPr marL="2971800" indent="-228600" eaLnBrk="0" fontAlgn="base" hangingPunct="0">
-              <a:spcBef>
-                <a:spcPct val="0"/>
-              </a:spcBef>
-              <a:spcAft>
-                <a:spcPct val="0"/>
-              </a:spcAft>
-              <a:defRPr>
-                <a:solidFill>
-                  <a:schemeClr val="tx1"/>
-                </a:solidFill>
-                <a:latin typeface="Calibri" panose="020F0502020204030204" pitchFamily="34" charset="0"/>
-              </a:defRPr>
-            </a:lvl7pPr>
-            <a:lvl8pPr marL="3429000" indent="-228600" eaLnBrk="0" fontAlgn="base" hangingPunct="0">
-              <a:spcBef>
-                <a:spcPct val="0"/>
-              </a:spcBef>
-              <a:spcAft>
-                <a:spcPct val="0"/>
-              </a:spcAft>
-              <a:defRPr>
-                <a:solidFill>
-                  <a:schemeClr val="tx1"/>
-                </a:solidFill>
-                <a:latin typeface="Calibri" panose="020F0502020204030204" pitchFamily="34" charset="0"/>
-              </a:defRPr>
-            </a:lvl8pPr>
-            <a:lvl9pPr marL="3886200" indent="-228600" eaLnBrk="0" fontAlgn="base" hangingPunct="0">
-              <a:spcBef>
-                <a:spcPct val="0"/>
-              </a:spcBef>
-              <a:spcAft>
-                <a:spcPct val="0"/>
-              </a:spcAft>
-              <a:defRPr>
-                <a:solidFill>
-                  <a:schemeClr val="tx1"/>
-                </a:solidFill>
-                <a:latin typeface="Calibri" panose="020F0502020204030204" pitchFamily="34" charset="0"/>
-              </a:defRPr>
-            </a:lvl9pPr>
-          </a:lstStyle>
-          <a:p>
-            <a:pPr algn="ctr" eaLnBrk="1" hangingPunct="1"/>
-            <a:r>
-              <a:rPr lang="en-US" altLang="en-US" sz="1100" dirty="0">
-                <a:latin typeface="Arial" panose="020B0604020202020204" pitchFamily="34" charset="0"/>
-                <a:ea typeface="Amazon Ember" panose="020B0603020204020204" pitchFamily="34" charset="0"/>
-                <a:cs typeface="Arial" panose="020B0604020202020204" pitchFamily="34" charset="0"/>
-              </a:rPr>
-              <a:t>F5 example application</a:t>
-            </a:r>
-          </a:p>
-        </p:txBody>
-      </p:sp>
-      <p:sp>
-        <p:nvSpPr>
-          <p:cNvPr id="40" name="TextBox 16">
-            <a:extLst>
-              <a:ext uri="{FF2B5EF4-FFF2-40B4-BE49-F238E27FC236}">
-                <a16:creationId xmlns:a16="http://schemas.microsoft.com/office/drawing/2014/main" id="{D03DC726-36ED-4041-B9EA-046153E22781}"/>
-              </a:ext>
-            </a:extLst>
-          </p:cNvPr>
-          <p:cNvSpPr txBox="1">
-            <a:spLocks noChangeArrowheads="1"/>
-          </p:cNvSpPr>
-          <p:nvPr/>
-        </p:nvSpPr>
-        <p:spPr bwMode="auto">
-          <a:xfrm>
-            <a:off x="8481309" y="5817324"/>
+            <a:off x="4375097" y="6757490"/>
             <a:ext cx="1115568" cy="430887"/>
           </a:xfrm>
           <a:prstGeom prst="rect">
@@ -6844,67 +6241,7 @@
         </p:blipFill>
         <p:spPr bwMode="auto">
           <a:xfrm>
-            <a:off x="4052550" y="5344775"/>
-            <a:ext cx="469900" cy="469900"/>
-          </a:xfrm>
-          <a:prstGeom prst="rect">
-            <a:avLst/>
-          </a:prstGeom>
-          <a:noFill/>
-          <a:ln>
-            <a:noFill/>
-          </a:ln>
-          <a:extLst>
-            <a:ext uri="{909E8E84-426E-40DD-AFC4-6F175D3DCCD1}">
-              <a14:hiddenFill xmlns:a14="http://schemas.microsoft.com/office/drawing/2010/main">
-                <a:solidFill>
-                  <a:srgbClr val="FFFFFF"/>
-                </a:solidFill>
-              </a14:hiddenFill>
-            </a:ext>
-            <a:ext uri="{91240B29-F687-4F45-9708-019B960494DF}">
-              <a14:hiddenLine xmlns:a14="http://schemas.microsoft.com/office/drawing/2010/main" w="9525">
-                <a:solidFill>
-                  <a:srgbClr val="000000"/>
-                </a:solidFill>
-                <a:miter lim="800000"/>
-                <a:headEnd/>
-                <a:tailEnd/>
-              </a14:hiddenLine>
-            </a:ext>
-          </a:extLst>
-        </p:spPr>
-      </p:pic>
-      <p:pic>
-        <p:nvPicPr>
-          <p:cNvPr id="76" name="Graphic 13">
-            <a:extLst>
-              <a:ext uri="{FF2B5EF4-FFF2-40B4-BE49-F238E27FC236}">
-                <a16:creationId xmlns:a16="http://schemas.microsoft.com/office/drawing/2014/main" id="{34CD0014-4BEC-4965-96BF-FBCFC7490DB5}"/>
-              </a:ext>
-            </a:extLst>
-          </p:cNvPr>
-          <p:cNvPicPr>
-            <a:picLocks noChangeAspect="1" noChangeArrowheads="1"/>
-          </p:cNvPicPr>
-          <p:nvPr/>
-        </p:nvPicPr>
-        <p:blipFill>
-          <a:blip r:embed="rId18">
-            <a:extLst>
-              <a:ext uri="{28A0092B-C50C-407E-A947-70E740481C1C}">
-                <a14:useLocalDpi xmlns:a14="http://schemas.microsoft.com/office/drawing/2010/main" val="0"/>
-              </a:ext>
-            </a:extLst>
-          </a:blip>
-          <a:srcRect/>
-          <a:stretch>
-            <a:fillRect/>
-          </a:stretch>
-        </p:blipFill>
-        <p:spPr bwMode="auto">
-          <a:xfrm>
-            <a:off x="8804143" y="5360996"/>
+            <a:off x="4677545" y="6412346"/>
             <a:ext cx="469900" cy="469900"/>
           </a:xfrm>
           <a:prstGeom prst="rect">
@@ -6964,8 +6301,8 @@
         </p:blipFill>
         <p:spPr bwMode="auto">
           <a:xfrm>
-            <a:off x="10267165" y="3680460"/>
-            <a:ext cx="457200" cy="457200"/>
+            <a:off x="10027064" y="4297447"/>
+            <a:ext cx="865954" cy="865954"/>
           </a:xfrm>
           <a:prstGeom prst="rect">
             <a:avLst/>
@@ -7011,8 +6348,8 @@
         </p:nvSpPr>
         <p:spPr bwMode="auto">
           <a:xfrm>
-            <a:off x="9937981" y="4153707"/>
-            <a:ext cx="1115568" cy="430887"/>
+            <a:off x="9738927" y="5206023"/>
+            <a:ext cx="1426307" cy="261610"/>
           </a:xfrm>
           <a:prstGeom prst="rect">
             <a:avLst/>
@@ -7158,171 +6495,214 @@
       </p:sp>
       <p:sp>
         <p:nvSpPr>
-          <p:cNvPr id="77" name="TextBox 18">
+          <p:cNvPr id="2" name="Rectangle 1">
             <a:extLst>
               <a:ext uri="{FF2B5EF4-FFF2-40B4-BE49-F238E27FC236}">
-                <a16:creationId xmlns:a16="http://schemas.microsoft.com/office/drawing/2014/main" id="{8D4194EA-C85A-4629-994D-E7DC2992F260}"/>
+                <a16:creationId xmlns:a16="http://schemas.microsoft.com/office/drawing/2014/main" id="{973FE2B8-9FAF-D23E-9DA8-072341B46B83}"/>
               </a:ext>
             </a:extLst>
           </p:cNvPr>
-          <p:cNvSpPr txBox="1">
-            <a:spLocks noChangeArrowheads="1"/>
-          </p:cNvSpPr>
+          <p:cNvSpPr/>
           <p:nvPr/>
         </p:nvSpPr>
-        <p:spPr bwMode="auto">
+        <p:spPr>
           <a:xfrm>
-            <a:off x="5019020" y="5810886"/>
-            <a:ext cx="1342852" cy="430887"/>
+            <a:off x="3737355" y="5935654"/>
+            <a:ext cx="2674832" cy="1661767"/>
           </a:xfrm>
           <a:prstGeom prst="rect">
             <a:avLst/>
           </a:prstGeom>
-          <a:noFill/>
-          <a:ln>
+          <a:solidFill>
+            <a:srgbClr val="007CBC">
+              <a:alpha val="9804"/>
+            </a:srgbClr>
+          </a:solidFill>
+          <a:ln w="12700">
             <a:noFill/>
+            <a:prstDash val="dash"/>
           </a:ln>
-          <a:extLst>
-            <a:ext uri="{909E8E84-426E-40DD-AFC4-6F175D3DCCD1}">
-              <a14:hiddenFill xmlns:a14="http://schemas.microsoft.com/office/drawing/2010/main">
-                <a:solidFill>
-                  <a:srgbClr val="FFFFFF"/>
-                </a:solidFill>
-              </a14:hiddenFill>
-            </a:ext>
-            <a:ext uri="{91240B29-F687-4F45-9708-019B960494DF}">
-              <a14:hiddenLine xmlns:a14="http://schemas.microsoft.com/office/drawing/2010/main" w="9525">
-                <a:solidFill>
-                  <a:srgbClr val="000000"/>
-                </a:solidFill>
-                <a:miter lim="800000"/>
-                <a:headEnd/>
-                <a:tailEnd/>
-              </a14:hiddenLine>
-            </a:ext>
-          </a:extLst>
         </p:spPr>
-        <p:txBody>
-          <a:bodyPr wrap="square">
-            <a:spAutoFit/>
-          </a:bodyPr>
-          <a:lstStyle>
-            <a:lvl1pPr>
-              <a:defRPr>
-                <a:solidFill>
-                  <a:schemeClr val="tx1"/>
-                </a:solidFill>
-                <a:latin typeface="Calibri" panose="020F0502020204030204" pitchFamily="34" charset="0"/>
-              </a:defRPr>
-            </a:lvl1pPr>
-            <a:lvl2pPr marL="742950" indent="-285750">
-              <a:defRPr>
-                <a:solidFill>
-                  <a:schemeClr val="tx1"/>
-                </a:solidFill>
-                <a:latin typeface="Calibri" panose="020F0502020204030204" pitchFamily="34" charset="0"/>
-              </a:defRPr>
-            </a:lvl2pPr>
-            <a:lvl3pPr marL="1143000" indent="-228600">
-              <a:defRPr>
-                <a:solidFill>
-                  <a:schemeClr val="tx1"/>
-                </a:solidFill>
-                <a:latin typeface="Calibri" panose="020F0502020204030204" pitchFamily="34" charset="0"/>
-              </a:defRPr>
-            </a:lvl3pPr>
-            <a:lvl4pPr marL="1600200" indent="-228600">
-              <a:defRPr>
-                <a:solidFill>
-                  <a:schemeClr val="tx1"/>
-                </a:solidFill>
-                <a:latin typeface="Calibri" panose="020F0502020204030204" pitchFamily="34" charset="0"/>
-              </a:defRPr>
-            </a:lvl4pPr>
-            <a:lvl5pPr marL="2057400" indent="-228600">
-              <a:defRPr>
-                <a:solidFill>
-                  <a:schemeClr val="tx1"/>
-                </a:solidFill>
-                <a:latin typeface="Calibri" panose="020F0502020204030204" pitchFamily="34" charset="0"/>
-              </a:defRPr>
-            </a:lvl5pPr>
-            <a:lvl6pPr marL="2514600" indent="-228600" eaLnBrk="0" fontAlgn="base" hangingPunct="0">
-              <a:spcBef>
-                <a:spcPct val="0"/>
-              </a:spcBef>
-              <a:spcAft>
-                <a:spcPct val="0"/>
-              </a:spcAft>
-              <a:defRPr>
-                <a:solidFill>
-                  <a:schemeClr val="tx1"/>
-                </a:solidFill>
-                <a:latin typeface="Calibri" panose="020F0502020204030204" pitchFamily="34" charset="0"/>
-              </a:defRPr>
-            </a:lvl6pPr>
-            <a:lvl7pPr marL="2971800" indent="-228600" eaLnBrk="0" fontAlgn="base" hangingPunct="0">
-              <a:spcBef>
-                <a:spcPct val="0"/>
-              </a:spcBef>
-              <a:spcAft>
-                <a:spcPct val="0"/>
-              </a:spcAft>
-              <a:defRPr>
-                <a:solidFill>
-                  <a:schemeClr val="tx1"/>
-                </a:solidFill>
-                <a:latin typeface="Calibri" panose="020F0502020204030204" pitchFamily="34" charset="0"/>
-              </a:defRPr>
-            </a:lvl7pPr>
-            <a:lvl8pPr marL="3429000" indent="-228600" eaLnBrk="0" fontAlgn="base" hangingPunct="0">
-              <a:spcBef>
-                <a:spcPct val="0"/>
-              </a:spcBef>
-              <a:spcAft>
-                <a:spcPct val="0"/>
-              </a:spcAft>
-              <a:defRPr>
-                <a:solidFill>
-                  <a:schemeClr val="tx1"/>
-                </a:solidFill>
-                <a:latin typeface="Calibri" panose="020F0502020204030204" pitchFamily="34" charset="0"/>
-              </a:defRPr>
-            </a:lvl8pPr>
-            <a:lvl9pPr marL="3886200" indent="-228600" eaLnBrk="0" fontAlgn="base" hangingPunct="0">
-              <a:spcBef>
-                <a:spcPct val="0"/>
-              </a:spcBef>
-              <a:spcAft>
-                <a:spcPct val="0"/>
-              </a:spcAft>
-              <a:defRPr>
-                <a:solidFill>
-                  <a:schemeClr val="tx1"/>
-                </a:solidFill>
-                <a:latin typeface="Calibri" panose="020F0502020204030204" pitchFamily="34" charset="0"/>
-              </a:defRPr>
-            </a:lvl9pPr>
-          </a:lstStyle>
-          <a:p>
-            <a:pPr algn="ctr" eaLnBrk="1" hangingPunct="1"/>
-            <a:r>
-              <a:rPr lang="en-US" altLang="en-US" sz="1100" dirty="0">
+        <p:style>
+          <a:lnRef idx="2">
+            <a:schemeClr val="accent1">
+              <a:shade val="50000"/>
+            </a:schemeClr>
+          </a:lnRef>
+          <a:fillRef idx="1">
+            <a:schemeClr val="accent1"/>
+          </a:fillRef>
+          <a:effectRef idx="0">
+            <a:schemeClr val="accent1"/>
+          </a:effectRef>
+          <a:fontRef idx="minor">
+            <a:schemeClr val="lt1"/>
+          </a:fontRef>
+        </p:style>
+        <p:txBody>
+          <a:bodyPr lIns="502920"/>
+          <a:lstStyle/>
+          <a:p>
+            <a:pPr>
+              <a:defRPr/>
+            </a:pPr>
+            <a:r>
+              <a:rPr lang="en-US" sz="1200" dirty="0">
+                <a:solidFill>
+                  <a:srgbClr val="5B9CD5"/>
+                </a:solidFill>
                 <a:latin typeface="Arial" panose="020B0604020202020204" pitchFamily="34" charset="0"/>
-                <a:ea typeface="Amazon Ember" panose="020B0603020204020204" pitchFamily="34" charset="0"/>
                 <a:cs typeface="Arial" panose="020B0604020202020204" pitchFamily="34" charset="0"/>
               </a:rPr>
-              <a:t>Elastic network interface</a:t>
+              <a:t>Private subnet 2</a:t>
             </a:r>
           </a:p>
         </p:txBody>
       </p:sp>
       <p:pic>
         <p:nvPicPr>
-          <p:cNvPr id="78" name="Graphic 37">
+          <p:cNvPr id="3" name="Graphic 2">
             <a:extLst>
               <a:ext uri="{FF2B5EF4-FFF2-40B4-BE49-F238E27FC236}">
-                <a16:creationId xmlns:a16="http://schemas.microsoft.com/office/drawing/2014/main" id="{707BE448-BEF7-4F08-8610-EF332E2B4F2A}"/>
+                <a16:creationId xmlns:a16="http://schemas.microsoft.com/office/drawing/2014/main" id="{4CFAD5F0-1D9F-1170-C05C-8BAD55E1CFBB}"/>
+              </a:ext>
+            </a:extLst>
+          </p:cNvPr>
+          <p:cNvPicPr>
+            <a:picLocks noChangeAspect="1"/>
+          </p:cNvPicPr>
+          <p:nvPr/>
+        </p:nvPicPr>
+        <p:blipFill>
+          <a:blip r:embed="rId6">
+            <a:extLst>
+              <a:ext uri="{96DAC541-7B7A-43D3-8B79-37D633B846F1}">
+                <asvg:svgBlip xmlns:asvg="http://schemas.microsoft.com/office/drawing/2016/SVG/main" r:embed="rId7"/>
+              </a:ext>
+            </a:extLst>
+          </a:blip>
+          <a:stretch>
+            <a:fillRect/>
+          </a:stretch>
+        </p:blipFill>
+        <p:spPr>
+          <a:xfrm>
+            <a:off x="3742338" y="5945488"/>
+            <a:ext cx="381000" cy="381000"/>
+          </a:xfrm>
+          <a:prstGeom prst="rect">
+            <a:avLst/>
+          </a:prstGeom>
+        </p:spPr>
+      </p:pic>
+      <p:sp>
+        <p:nvSpPr>
+          <p:cNvPr id="4" name="Rectangle 3">
+            <a:extLst>
+              <a:ext uri="{FF2B5EF4-FFF2-40B4-BE49-F238E27FC236}">
+                <a16:creationId xmlns:a16="http://schemas.microsoft.com/office/drawing/2014/main" id="{D81745BD-9171-9B31-0BFC-090E41A4DE56}"/>
+              </a:ext>
+            </a:extLst>
+          </p:cNvPr>
+          <p:cNvSpPr/>
+          <p:nvPr/>
+        </p:nvSpPr>
+        <p:spPr>
+          <a:xfrm>
+            <a:off x="8414951" y="5931462"/>
+            <a:ext cx="2679192" cy="1665959"/>
+          </a:xfrm>
+          <a:prstGeom prst="rect">
+            <a:avLst/>
+          </a:prstGeom>
+          <a:solidFill>
+            <a:srgbClr val="007CBC">
+              <a:alpha val="9804"/>
+            </a:srgbClr>
+          </a:solidFill>
+          <a:ln w="12700">
+            <a:noFill/>
+            <a:prstDash val="dash"/>
+          </a:ln>
+        </p:spPr>
+        <p:style>
+          <a:lnRef idx="2">
+            <a:schemeClr val="accent1">
+              <a:shade val="50000"/>
+            </a:schemeClr>
+          </a:lnRef>
+          <a:fillRef idx="1">
+            <a:schemeClr val="accent1"/>
+          </a:fillRef>
+          <a:effectRef idx="0">
+            <a:schemeClr val="accent1"/>
+          </a:effectRef>
+          <a:fontRef idx="minor">
+            <a:schemeClr val="lt1"/>
+          </a:fontRef>
+        </p:style>
+        <p:txBody>
+          <a:bodyPr lIns="502920"/>
+          <a:lstStyle/>
+          <a:p>
+            <a:pPr>
+              <a:defRPr/>
+            </a:pPr>
+            <a:r>
+              <a:rPr lang="en-US" sz="1200" dirty="0">
+                <a:solidFill>
+                  <a:srgbClr val="5B9CD5"/>
+                </a:solidFill>
+                <a:latin typeface="Arial" panose="020B0604020202020204" pitchFamily="34" charset="0"/>
+                <a:cs typeface="Arial" panose="020B0604020202020204" pitchFamily="34" charset="0"/>
+              </a:rPr>
+              <a:t>Private subnet 2</a:t>
+            </a:r>
+          </a:p>
+        </p:txBody>
+      </p:sp>
+      <p:pic>
+        <p:nvPicPr>
+          <p:cNvPr id="7" name="Graphic 6">
+            <a:extLst>
+              <a:ext uri="{FF2B5EF4-FFF2-40B4-BE49-F238E27FC236}">
+                <a16:creationId xmlns:a16="http://schemas.microsoft.com/office/drawing/2014/main" id="{211653BC-671D-A1C4-CD0F-FE685FAA2F4B}"/>
+              </a:ext>
+            </a:extLst>
+          </p:cNvPr>
+          <p:cNvPicPr>
+            <a:picLocks noChangeAspect="1"/>
+          </p:cNvPicPr>
+          <p:nvPr/>
+        </p:nvPicPr>
+        <p:blipFill>
+          <a:blip r:embed="rId6">
+            <a:extLst>
+              <a:ext uri="{96DAC541-7B7A-43D3-8B79-37D633B846F1}">
+                <asvg:svgBlip xmlns:asvg="http://schemas.microsoft.com/office/drawing/2016/SVG/main" r:embed="rId7"/>
+              </a:ext>
+            </a:extLst>
+          </a:blip>
+          <a:stretch>
+            <a:fillRect/>
+          </a:stretch>
+        </p:blipFill>
+        <p:spPr>
+          <a:xfrm>
+            <a:off x="8414951" y="5933279"/>
+            <a:ext cx="381000" cy="381000"/>
+          </a:xfrm>
+          <a:prstGeom prst="rect">
+            <a:avLst/>
+          </a:prstGeom>
+        </p:spPr>
+      </p:pic>
+      <p:pic>
+        <p:nvPicPr>
+          <p:cNvPr id="8" name="Graphic 60">
+            <a:extLst>
+              <a:ext uri="{FF2B5EF4-FFF2-40B4-BE49-F238E27FC236}">
+                <a16:creationId xmlns:a16="http://schemas.microsoft.com/office/drawing/2014/main" id="{74880B57-B23F-0934-408C-E59AB244F96F}"/>
               </a:ext>
             </a:extLst>
           </p:cNvPr>
@@ -7332,7 +6712,7 @@
           <p:nvPr/>
         </p:nvPicPr>
         <p:blipFill>
-          <a:blip r:embed="rId19">
+          <a:blip r:embed="rId9">
             <a:extLst>
               <a:ext uri="{28A0092B-C50C-407E-A947-70E740481C1C}">
                 <a14:useLocalDpi xmlns:a14="http://schemas.microsoft.com/office/drawing/2010/main" val="0"/>
@@ -7346,8 +6726,8 @@
         </p:blipFill>
         <p:spPr bwMode="auto">
           <a:xfrm>
-            <a:off x="5459884" y="5334704"/>
-            <a:ext cx="457200" cy="457200"/>
+            <a:off x="5370259" y="4274814"/>
+            <a:ext cx="865954" cy="865954"/>
           </a:xfrm>
           <a:prstGeom prst="rect">
             <a:avLst/>
@@ -7379,10 +6759,10 @@
       </p:pic>
       <p:sp>
         <p:nvSpPr>
-          <p:cNvPr id="79" name="TextBox 18">
+          <p:cNvPr id="9" name="TextBox 16">
             <a:extLst>
               <a:ext uri="{FF2B5EF4-FFF2-40B4-BE49-F238E27FC236}">
-                <a16:creationId xmlns:a16="http://schemas.microsoft.com/office/drawing/2014/main" id="{06AC686F-8351-4CEF-AA6D-66CE2D06C3B4}"/>
+                <a16:creationId xmlns:a16="http://schemas.microsoft.com/office/drawing/2014/main" id="{248A3E13-5B3B-5F41-1B82-A05F9088D2B9}"/>
               </a:ext>
             </a:extLst>
           </p:cNvPr>
@@ -7393,8 +6773,8 @@
         </p:nvSpPr>
         <p:spPr bwMode="auto">
           <a:xfrm>
-            <a:off x="9854628" y="5814675"/>
-            <a:ext cx="1342852" cy="430887"/>
+            <a:off x="5073903" y="5206023"/>
+            <a:ext cx="1426307" cy="261610"/>
           </a:xfrm>
           <a:prstGeom prst="rect">
             <a:avLst/>
@@ -7424,7 +6804,7 @@
           </a:extLst>
         </p:spPr>
         <p:txBody>
-          <a:bodyPr wrap="square">
+          <a:bodyPr wrap="square" lIns="0" rIns="0">
             <a:spAutoFit/>
           </a:bodyPr>
           <a:lstStyle>
@@ -7533,17 +6913,342 @@
                 <a:ea typeface="Amazon Ember" panose="020B0603020204020204" pitchFamily="34" charset="0"/>
                 <a:cs typeface="Arial" panose="020B0604020202020204" pitchFamily="34" charset="0"/>
               </a:rPr>
-              <a:t>Elastic network interface</a:t>
+              <a:t>F5 BIG-IP instance</a:t>
+            </a:r>
+          </a:p>
+        </p:txBody>
+      </p:sp>
+      <p:sp>
+        <p:nvSpPr>
+          <p:cNvPr id="10" name="TextBox 9">
+            <a:extLst>
+              <a:ext uri="{FF2B5EF4-FFF2-40B4-BE49-F238E27FC236}">
+                <a16:creationId xmlns:a16="http://schemas.microsoft.com/office/drawing/2014/main" id="{18FA3415-157A-0B42-6847-343106DD18DF}"/>
+              </a:ext>
+            </a:extLst>
+          </p:cNvPr>
+          <p:cNvSpPr txBox="1"/>
+          <p:nvPr/>
+        </p:nvSpPr>
+        <p:spPr>
+          <a:xfrm>
+            <a:off x="4166855" y="5065291"/>
+            <a:ext cx="998485" cy="261610"/>
+          </a:xfrm>
+          <a:prstGeom prst="rect">
+            <a:avLst/>
+          </a:prstGeom>
+          <a:noFill/>
+        </p:spPr>
+        <p:txBody>
+          <a:bodyPr wrap="square" rtlCol="0">
+            <a:spAutoFit/>
+          </a:bodyPr>
+          <a:lstStyle/>
+          <a:p>
+            <a:r>
+              <a:rPr lang="en-US" sz="1100" i="1" dirty="0">
+                <a:solidFill>
+                  <a:srgbClr val="5B9CD5"/>
+                </a:solidFill>
+                <a:latin typeface="Arial" panose="020B0604020202020204" pitchFamily="34" charset="0"/>
+                <a:cs typeface="Arial" panose="020B0604020202020204" pitchFamily="34" charset="0"/>
+              </a:rPr>
+              <a:t>Management</a:t>
+            </a:r>
+          </a:p>
+        </p:txBody>
+      </p:sp>
+      <p:sp>
+        <p:nvSpPr>
+          <p:cNvPr id="12" name="TextBox 11">
+            <a:extLst>
+              <a:ext uri="{FF2B5EF4-FFF2-40B4-BE49-F238E27FC236}">
+                <a16:creationId xmlns:a16="http://schemas.microsoft.com/office/drawing/2014/main" id="{7E1FED91-96A3-2D8E-1ECF-67F20FB497AE}"/>
+              </a:ext>
+            </a:extLst>
+          </p:cNvPr>
+          <p:cNvSpPr txBox="1"/>
+          <p:nvPr/>
+        </p:nvSpPr>
+        <p:spPr>
+          <a:xfrm>
+            <a:off x="8845348" y="5099623"/>
+            <a:ext cx="998485" cy="261610"/>
+          </a:xfrm>
+          <a:prstGeom prst="rect">
+            <a:avLst/>
+          </a:prstGeom>
+          <a:noFill/>
+        </p:spPr>
+        <p:txBody>
+          <a:bodyPr wrap="square" rtlCol="0">
+            <a:spAutoFit/>
+          </a:bodyPr>
+          <a:lstStyle/>
+          <a:p>
+            <a:r>
+              <a:rPr lang="en-US" sz="1100" i="1" dirty="0">
+                <a:solidFill>
+                  <a:srgbClr val="5B9CD5"/>
+                </a:solidFill>
+                <a:latin typeface="Arial" panose="020B0604020202020204" pitchFamily="34" charset="0"/>
+                <a:cs typeface="Arial" panose="020B0604020202020204" pitchFamily="34" charset="0"/>
+              </a:rPr>
+              <a:t>Management</a:t>
+            </a:r>
+          </a:p>
+        </p:txBody>
+      </p:sp>
+      <p:sp>
+        <p:nvSpPr>
+          <p:cNvPr id="13" name="TextBox 12">
+            <a:extLst>
+              <a:ext uri="{FF2B5EF4-FFF2-40B4-BE49-F238E27FC236}">
+                <a16:creationId xmlns:a16="http://schemas.microsoft.com/office/drawing/2014/main" id="{3D9543AE-A672-72C7-5D97-DAA087969893}"/>
+              </a:ext>
+            </a:extLst>
+          </p:cNvPr>
+          <p:cNvSpPr txBox="1"/>
+          <p:nvPr/>
+        </p:nvSpPr>
+        <p:spPr>
+          <a:xfrm>
+            <a:off x="8805578" y="6132652"/>
+            <a:ext cx="998485" cy="261610"/>
+          </a:xfrm>
+          <a:prstGeom prst="rect">
+            <a:avLst/>
+          </a:prstGeom>
+          <a:noFill/>
+        </p:spPr>
+        <p:txBody>
+          <a:bodyPr wrap="square" rtlCol="0">
+            <a:spAutoFit/>
+          </a:bodyPr>
+          <a:lstStyle/>
+          <a:p>
+            <a:r>
+              <a:rPr lang="en-US" sz="1100" i="1" dirty="0">
+                <a:solidFill>
+                  <a:srgbClr val="5B9CD5"/>
+                </a:solidFill>
+                <a:latin typeface="Arial" panose="020B0604020202020204" pitchFamily="34" charset="0"/>
+                <a:cs typeface="Arial" panose="020B0604020202020204" pitchFamily="34" charset="0"/>
+              </a:rPr>
+              <a:t>Application</a:t>
+            </a:r>
+          </a:p>
+        </p:txBody>
+      </p:sp>
+      <p:sp>
+        <p:nvSpPr>
+          <p:cNvPr id="14" name="TextBox 13">
+            <a:extLst>
+              <a:ext uri="{FF2B5EF4-FFF2-40B4-BE49-F238E27FC236}">
+                <a16:creationId xmlns:a16="http://schemas.microsoft.com/office/drawing/2014/main" id="{E99A83B7-BE17-51B9-2C9F-5B2D09853FF1}"/>
+              </a:ext>
+            </a:extLst>
+          </p:cNvPr>
+          <p:cNvSpPr txBox="1"/>
+          <p:nvPr/>
+        </p:nvSpPr>
+        <p:spPr>
+          <a:xfrm>
+            <a:off x="4148960" y="6128710"/>
+            <a:ext cx="998485" cy="261610"/>
+          </a:xfrm>
+          <a:prstGeom prst="rect">
+            <a:avLst/>
+          </a:prstGeom>
+          <a:noFill/>
+        </p:spPr>
+        <p:txBody>
+          <a:bodyPr wrap="square" rtlCol="0">
+            <a:spAutoFit/>
+          </a:bodyPr>
+          <a:lstStyle/>
+          <a:p>
+            <a:r>
+              <a:rPr lang="en-US" sz="1100" i="1" dirty="0">
+                <a:solidFill>
+                  <a:srgbClr val="5B9CD5"/>
+                </a:solidFill>
+                <a:latin typeface="Arial" panose="020B0604020202020204" pitchFamily="34" charset="0"/>
+                <a:cs typeface="Arial" panose="020B0604020202020204" pitchFamily="34" charset="0"/>
+              </a:rPr>
+              <a:t>Application</a:t>
+            </a:r>
+          </a:p>
+        </p:txBody>
+      </p:sp>
+      <p:sp>
+        <p:nvSpPr>
+          <p:cNvPr id="15" name="TextBox 16">
+            <a:extLst>
+              <a:ext uri="{FF2B5EF4-FFF2-40B4-BE49-F238E27FC236}">
+                <a16:creationId xmlns:a16="http://schemas.microsoft.com/office/drawing/2014/main" id="{7C6C1DB7-5962-643C-E510-14717A203875}"/>
+              </a:ext>
+            </a:extLst>
+          </p:cNvPr>
+          <p:cNvSpPr txBox="1">
+            <a:spLocks noChangeArrowheads="1"/>
+          </p:cNvSpPr>
+          <p:nvPr/>
+        </p:nvSpPr>
+        <p:spPr bwMode="auto">
+          <a:xfrm>
+            <a:off x="9254716" y="6744598"/>
+            <a:ext cx="1115568" cy="430887"/>
+          </a:xfrm>
+          <a:prstGeom prst="rect">
+            <a:avLst/>
+          </a:prstGeom>
+          <a:noFill/>
+          <a:ln>
+            <a:noFill/>
+          </a:ln>
+          <a:extLst>
+            <a:ext uri="{909E8E84-426E-40DD-AFC4-6F175D3DCCD1}">
+              <a14:hiddenFill xmlns:a14="http://schemas.microsoft.com/office/drawing/2010/main">
+                <a:solidFill>
+                  <a:srgbClr val="FFFFFF"/>
+                </a:solidFill>
+              </a14:hiddenFill>
+            </a:ext>
+            <a:ext uri="{91240B29-F687-4F45-9708-019B960494DF}">
+              <a14:hiddenLine xmlns:a14="http://schemas.microsoft.com/office/drawing/2010/main" w="9525">
+                <a:solidFill>
+                  <a:srgbClr val="000000"/>
+                </a:solidFill>
+                <a:miter lim="800000"/>
+                <a:headEnd/>
+                <a:tailEnd/>
+              </a14:hiddenLine>
+            </a:ext>
+          </a:extLst>
+        </p:spPr>
+        <p:txBody>
+          <a:bodyPr wrap="square" lIns="0" rIns="0">
+            <a:spAutoFit/>
+          </a:bodyPr>
+          <a:lstStyle>
+            <a:lvl1pPr>
+              <a:defRPr>
+                <a:solidFill>
+                  <a:schemeClr val="tx1"/>
+                </a:solidFill>
+                <a:latin typeface="Calibri" panose="020F0502020204030204" pitchFamily="34" charset="0"/>
+              </a:defRPr>
+            </a:lvl1pPr>
+            <a:lvl2pPr marL="742950" indent="-285750">
+              <a:defRPr>
+                <a:solidFill>
+                  <a:schemeClr val="tx1"/>
+                </a:solidFill>
+                <a:latin typeface="Calibri" panose="020F0502020204030204" pitchFamily="34" charset="0"/>
+              </a:defRPr>
+            </a:lvl2pPr>
+            <a:lvl3pPr marL="1143000" indent="-228600">
+              <a:defRPr>
+                <a:solidFill>
+                  <a:schemeClr val="tx1"/>
+                </a:solidFill>
+                <a:latin typeface="Calibri" panose="020F0502020204030204" pitchFamily="34" charset="0"/>
+              </a:defRPr>
+            </a:lvl3pPr>
+            <a:lvl4pPr marL="1600200" indent="-228600">
+              <a:defRPr>
+                <a:solidFill>
+                  <a:schemeClr val="tx1"/>
+                </a:solidFill>
+                <a:latin typeface="Calibri" panose="020F0502020204030204" pitchFamily="34" charset="0"/>
+              </a:defRPr>
+            </a:lvl4pPr>
+            <a:lvl5pPr marL="2057400" indent="-228600">
+              <a:defRPr>
+                <a:solidFill>
+                  <a:schemeClr val="tx1"/>
+                </a:solidFill>
+                <a:latin typeface="Calibri" panose="020F0502020204030204" pitchFamily="34" charset="0"/>
+              </a:defRPr>
+            </a:lvl5pPr>
+            <a:lvl6pPr marL="2514600" indent="-228600" eaLnBrk="0" fontAlgn="base" hangingPunct="0">
+              <a:spcBef>
+                <a:spcPct val="0"/>
+              </a:spcBef>
+              <a:spcAft>
+                <a:spcPct val="0"/>
+              </a:spcAft>
+              <a:defRPr>
+                <a:solidFill>
+                  <a:schemeClr val="tx1"/>
+                </a:solidFill>
+                <a:latin typeface="Calibri" panose="020F0502020204030204" pitchFamily="34" charset="0"/>
+              </a:defRPr>
+            </a:lvl6pPr>
+            <a:lvl7pPr marL="2971800" indent="-228600" eaLnBrk="0" fontAlgn="base" hangingPunct="0">
+              <a:spcBef>
+                <a:spcPct val="0"/>
+              </a:spcBef>
+              <a:spcAft>
+                <a:spcPct val="0"/>
+              </a:spcAft>
+              <a:defRPr>
+                <a:solidFill>
+                  <a:schemeClr val="tx1"/>
+                </a:solidFill>
+                <a:latin typeface="Calibri" panose="020F0502020204030204" pitchFamily="34" charset="0"/>
+              </a:defRPr>
+            </a:lvl7pPr>
+            <a:lvl8pPr marL="3429000" indent="-228600" eaLnBrk="0" fontAlgn="base" hangingPunct="0">
+              <a:spcBef>
+                <a:spcPct val="0"/>
+              </a:spcBef>
+              <a:spcAft>
+                <a:spcPct val="0"/>
+              </a:spcAft>
+              <a:defRPr>
+                <a:solidFill>
+                  <a:schemeClr val="tx1"/>
+                </a:solidFill>
+                <a:latin typeface="Calibri" panose="020F0502020204030204" pitchFamily="34" charset="0"/>
+              </a:defRPr>
+            </a:lvl8pPr>
+            <a:lvl9pPr marL="3886200" indent="-228600" eaLnBrk="0" fontAlgn="base" hangingPunct="0">
+              <a:spcBef>
+                <a:spcPct val="0"/>
+              </a:spcBef>
+              <a:spcAft>
+                <a:spcPct val="0"/>
+              </a:spcAft>
+              <a:defRPr>
+                <a:solidFill>
+                  <a:schemeClr val="tx1"/>
+                </a:solidFill>
+                <a:latin typeface="Calibri" panose="020F0502020204030204" pitchFamily="34" charset="0"/>
+              </a:defRPr>
+            </a:lvl9pPr>
+          </a:lstStyle>
+          <a:p>
+            <a:pPr algn="ctr" eaLnBrk="1" hangingPunct="1"/>
+            <a:r>
+              <a:rPr lang="en-US" altLang="en-US" sz="1100" dirty="0">
+                <a:latin typeface="Arial" panose="020B0604020202020204" pitchFamily="34" charset="0"/>
+                <a:ea typeface="Amazon Ember" panose="020B0603020204020204" pitchFamily="34" charset="0"/>
+                <a:cs typeface="Arial" panose="020B0604020202020204" pitchFamily="34" charset="0"/>
+              </a:rPr>
+              <a:t>F5 example application</a:t>
             </a:r>
           </a:p>
         </p:txBody>
       </p:sp>
       <p:pic>
         <p:nvPicPr>
-          <p:cNvPr id="80" name="Graphic 37">
+          <p:cNvPr id="16" name="Graphic 13">
             <a:extLst>
               <a:ext uri="{FF2B5EF4-FFF2-40B4-BE49-F238E27FC236}">
-                <a16:creationId xmlns:a16="http://schemas.microsoft.com/office/drawing/2014/main" id="{125B2DB8-14A6-4AB2-8150-5E97945A4F93}"/>
+                <a16:creationId xmlns:a16="http://schemas.microsoft.com/office/drawing/2014/main" id="{4F2C5D2C-19C2-5EA4-98D8-EE2A584524C3}"/>
               </a:ext>
             </a:extLst>
           </p:cNvPr>
@@ -7553,7 +7258,7 @@
           <p:nvPr/>
         </p:nvPicPr>
         <p:blipFill>
-          <a:blip r:embed="rId19">
+          <a:blip r:embed="rId18">
             <a:extLst>
               <a:ext uri="{28A0092B-C50C-407E-A947-70E740481C1C}">
                 <a14:useLocalDpi xmlns:a14="http://schemas.microsoft.com/office/drawing/2010/main" val="0"/>
@@ -7567,8 +7272,8 @@
         </p:blipFill>
         <p:spPr bwMode="auto">
           <a:xfrm>
-            <a:off x="10267165" y="5334704"/>
-            <a:ext cx="457200" cy="457200"/>
+            <a:off x="9557164" y="6399454"/>
+            <a:ext cx="469900" cy="469900"/>
           </a:xfrm>
           <a:prstGeom prst="rect">
             <a:avLst/>
@@ -7598,96 +7303,6 @@
           </a:extLst>
         </p:spPr>
       </p:pic>
-      <p:cxnSp>
-        <p:nvCxnSpPr>
-          <p:cNvPr id="84" name="Straight Arrow Connector 83">
-            <a:extLst>
-              <a:ext uri="{FF2B5EF4-FFF2-40B4-BE49-F238E27FC236}">
-                <a16:creationId xmlns:a16="http://schemas.microsoft.com/office/drawing/2014/main" id="{FB35EED3-368B-47F7-9B1C-0121C77DBDB4}"/>
-              </a:ext>
-            </a:extLst>
-          </p:cNvPr>
-          <p:cNvCxnSpPr>
-            <a:cxnSpLocks/>
-          </p:cNvCxnSpPr>
-          <p:nvPr/>
-        </p:nvCxnSpPr>
-        <p:spPr>
-          <a:xfrm rot="-5400000">
-            <a:off x="5322724" y="4945555"/>
-            <a:ext cx="731520" cy="0"/>
-          </a:xfrm>
-          <a:prstGeom prst="straightConnector1">
-            <a:avLst/>
-          </a:prstGeom>
-          <a:ln w="12700">
-            <a:solidFill>
-              <a:schemeClr val="tx2"/>
-            </a:solidFill>
-            <a:headEnd type="arrow" w="med" len="sm"/>
-            <a:tailEnd type="none" w="med" len="sm"/>
-          </a:ln>
-        </p:spPr>
-        <p:style>
-          <a:lnRef idx="1">
-            <a:schemeClr val="accent1"/>
-          </a:lnRef>
-          <a:fillRef idx="0">
-            <a:schemeClr val="accent1"/>
-          </a:fillRef>
-          <a:effectRef idx="0">
-            <a:schemeClr val="accent1"/>
-          </a:effectRef>
-          <a:fontRef idx="minor">
-            <a:schemeClr val="tx1"/>
-          </a:fontRef>
-        </p:style>
-      </p:cxnSp>
-      <p:cxnSp>
-        <p:nvCxnSpPr>
-          <p:cNvPr id="68" name="Straight Arrow Connector 67">
-            <a:extLst>
-              <a:ext uri="{FF2B5EF4-FFF2-40B4-BE49-F238E27FC236}">
-                <a16:creationId xmlns:a16="http://schemas.microsoft.com/office/drawing/2014/main" id="{835AE074-69FA-43AF-8616-FA316F745682}"/>
-              </a:ext>
-            </a:extLst>
-          </p:cNvPr>
-          <p:cNvCxnSpPr>
-            <a:cxnSpLocks/>
-          </p:cNvCxnSpPr>
-          <p:nvPr/>
-        </p:nvCxnSpPr>
-        <p:spPr>
-          <a:xfrm rot="-5400000">
-            <a:off x="10130005" y="4952553"/>
-            <a:ext cx="731520" cy="0"/>
-          </a:xfrm>
-          <a:prstGeom prst="straightConnector1">
-            <a:avLst/>
-          </a:prstGeom>
-          <a:ln w="12700">
-            <a:solidFill>
-              <a:schemeClr val="tx2"/>
-            </a:solidFill>
-            <a:headEnd type="arrow" w="med" len="sm"/>
-            <a:tailEnd type="none" w="med" len="sm"/>
-          </a:ln>
-        </p:spPr>
-        <p:style>
-          <a:lnRef idx="1">
-            <a:schemeClr val="accent1"/>
-          </a:lnRef>
-          <a:fillRef idx="0">
-            <a:schemeClr val="accent1"/>
-          </a:fillRef>
-          <a:effectRef idx="0">
-            <a:schemeClr val="accent1"/>
-          </a:effectRef>
-          <a:fontRef idx="minor">
-            <a:schemeClr val="tx1"/>
-          </a:fontRef>
-        </p:style>
-      </p:cxnSp>
     </p:spTree>
     <p:extLst>
       <p:ext uri="{BB962C8B-B14F-4D97-AF65-F5344CB8AC3E}">

</xml_diff>